<commit_message>
avancée sur le dossier de conception
</commit_message>
<xml_diff>
--- a/dossier-conception/dossier-conception-a11e-v2.pptx
+++ b/dossier-conception/dossier-conception-a11e-v2.pptx
@@ -16,12 +16,16 @@
     <p:sldId id="263" r:id="rId10"/>
     <p:sldId id="264" r:id="rId11"/>
     <p:sldId id="265" r:id="rId12"/>
-    <p:sldId id="267" r:id="rId13"/>
-    <p:sldId id="268" r:id="rId14"/>
-    <p:sldId id="269" r:id="rId15"/>
-    <p:sldId id="262" r:id="rId16"/>
-    <p:sldId id="270" r:id="rId17"/>
-    <p:sldId id="271" r:id="rId18"/>
+    <p:sldId id="277" r:id="rId13"/>
+    <p:sldId id="279" r:id="rId14"/>
+    <p:sldId id="280" r:id="rId15"/>
+    <p:sldId id="282" r:id="rId16"/>
+    <p:sldId id="267" r:id="rId17"/>
+    <p:sldId id="268" r:id="rId18"/>
+    <p:sldId id="269" r:id="rId19"/>
+    <p:sldId id="262" r:id="rId20"/>
+    <p:sldId id="270" r:id="rId21"/>
+    <p:sldId id="271" r:id="rId22"/>
   </p:sldIdLst>
   <p:sldSz cx="12192000" cy="6858000"/>
   <p:notesSz cx="6858000" cy="9144000"/>
@@ -3741,10 +3745,10 @@
       </p:pic>
       <p:pic>
         <p:nvPicPr>
-          <p:cNvPr id="15" name="Graphique 14">
-            <a:extLst>
-              <a:ext uri="{FF2B5EF4-FFF2-40B4-BE49-F238E27FC236}">
-                <a16:creationId xmlns:a16="http://schemas.microsoft.com/office/drawing/2014/main" id="{16E2206D-3596-44EE-B18A-9FE4D1327938}"/>
+          <p:cNvPr id="3" name="Image 2">
+            <a:extLst>
+              <a:ext uri="{FF2B5EF4-FFF2-40B4-BE49-F238E27FC236}">
+                <a16:creationId xmlns:a16="http://schemas.microsoft.com/office/drawing/2014/main" id="{5DF3BA3A-D99D-4D81-985E-F0A0930CA075}"/>
               </a:ext>
             </a:extLst>
           </p:cNvPr>
@@ -3759,9 +3763,6 @@
               <a:ext uri="{28A0092B-C50C-407E-A947-70E740481C1C}">
                 <a14:useLocalDpi xmlns:a14="http://schemas.microsoft.com/office/drawing/2010/main" val="0"/>
               </a:ext>
-              <a:ext uri="{96DAC541-7B7A-43D3-8B79-37D633B846F1}">
-                <asvg:svgBlip xmlns:asvg="http://schemas.microsoft.com/office/drawing/2016/SVG/main" r:embed="rId4"/>
-              </a:ext>
             </a:extLst>
           </a:blip>
           <a:stretch>
@@ -3770,8 +3771,8 @@
         </p:blipFill>
         <p:spPr>
           <a:xfrm>
-            <a:off x="2482769" y="-3037"/>
-            <a:ext cx="9709231" cy="6861037"/>
+            <a:off x="2085975" y="621355"/>
+            <a:ext cx="8020050" cy="5667375"/>
           </a:xfrm>
           <a:prstGeom prst="rect">
             <a:avLst/>
@@ -5162,7 +5163,69 @@
             <a:pPr algn="ctr"/>
             <a:r>
               <a:rPr lang="fr-FR" sz="6000" b="1" spc="600" dirty="0"/>
-              <a:t>Wireframe</a:t>
+              <a:t>Vidéo d’introduction</a:t>
+            </a:r>
+          </a:p>
+        </p:txBody>
+      </p:sp>
+      <p:sp>
+        <p:nvSpPr>
+          <p:cNvPr id="7" name="ZoneTexte 6">
+            <a:extLst>
+              <a:ext uri="{FF2B5EF4-FFF2-40B4-BE49-F238E27FC236}">
+                <a16:creationId xmlns:a16="http://schemas.microsoft.com/office/drawing/2014/main" id="{CB75C8D1-C65C-4BDD-A10E-EA2BD1D8AE39}"/>
+              </a:ext>
+            </a:extLst>
+          </p:cNvPr>
+          <p:cNvSpPr txBox="1"/>
+          <p:nvPr/>
+        </p:nvSpPr>
+        <p:spPr>
+          <a:xfrm>
+            <a:off x="3226260" y="2426488"/>
+            <a:ext cx="6722274" cy="1964512"/>
+          </a:xfrm>
+          <a:prstGeom prst="rect">
+            <a:avLst/>
+          </a:prstGeom>
+          <a:noFill/>
+        </p:spPr>
+        <p:txBody>
+          <a:bodyPr wrap="square" rtlCol="0">
+            <a:spAutoFit/>
+          </a:bodyPr>
+          <a:lstStyle/>
+          <a:p>
+            <a:pPr>
+              <a:lnSpc>
+                <a:spcPct val="150000"/>
+              </a:lnSpc>
+            </a:pPr>
+            <a:r>
+              <a:rPr lang="fr-FR" sz="2800" dirty="0"/>
+              <a:t>Directement sur la page d’accueil</a:t>
+            </a:r>
+          </a:p>
+          <a:p>
+            <a:pPr>
+              <a:lnSpc>
+                <a:spcPct val="150000"/>
+              </a:lnSpc>
+            </a:pPr>
+            <a:r>
+              <a:rPr lang="fr-FR" sz="2800" dirty="0"/>
+              <a:t>Sous-titrée sur YouTube</a:t>
+            </a:r>
+          </a:p>
+          <a:p>
+            <a:pPr>
+              <a:lnSpc>
+                <a:spcPct val="150000"/>
+              </a:lnSpc>
+            </a:pPr>
+            <a:r>
+              <a:rPr lang="fr-FR" sz="2800" dirty="0"/>
+              <a:t>Doublée en langue des signe par l’interprète</a:t>
             </a:r>
           </a:p>
         </p:txBody>
@@ -5170,7 +5233,7 @@
     </p:spTree>
     <p:extLst>
       <p:ext uri="{BB962C8B-B14F-4D97-AF65-F5344CB8AC3E}">
-        <p14:creationId xmlns:p14="http://schemas.microsoft.com/office/powerpoint/2010/main" val="98831832"/>
+        <p14:creationId xmlns:p14="http://schemas.microsoft.com/office/powerpoint/2010/main" val="1628324950"/>
       </p:ext>
     </p:extLst>
   </p:cSld>
@@ -5608,8 +5671,8 @@
         </p:nvSpPr>
         <p:spPr>
           <a:xfrm>
-            <a:off x="-109959" y="207380"/>
-            <a:ext cx="12301958" cy="1015663"/>
+            <a:off x="1041208" y="113862"/>
+            <a:ext cx="10560626" cy="769441"/>
           </a:xfrm>
           <a:prstGeom prst="rect">
             <a:avLst/>
@@ -5624,16 +5687,83 @@
           <a:p>
             <a:pPr algn="ctr"/>
             <a:r>
-              <a:rPr lang="fr-FR" sz="6000" b="1" spc="600" dirty="0"/>
-              <a:t>Maquette</a:t>
+              <a:rPr lang="fr-FR" sz="4400" b="1" spc="600" dirty="0"/>
+              <a:t>Interview – retour de l’utilisateur</a:t>
             </a:r>
+          </a:p>
+        </p:txBody>
+      </p:sp>
+      <p:sp>
+        <p:nvSpPr>
+          <p:cNvPr id="7" name="ZoneTexte 6">
+            <a:extLst>
+              <a:ext uri="{FF2B5EF4-FFF2-40B4-BE49-F238E27FC236}">
+                <a16:creationId xmlns:a16="http://schemas.microsoft.com/office/drawing/2014/main" id="{247CDC12-8CCB-4EC4-BCDD-C585EC8F99FD}"/>
+              </a:ext>
+            </a:extLst>
+          </p:cNvPr>
+          <p:cNvSpPr txBox="1"/>
+          <p:nvPr/>
+        </p:nvSpPr>
+        <p:spPr>
+          <a:xfrm>
+            <a:off x="3024109" y="2426488"/>
+            <a:ext cx="6594823" cy="1964512"/>
+          </a:xfrm>
+          <a:prstGeom prst="rect">
+            <a:avLst/>
+          </a:prstGeom>
+          <a:noFill/>
+        </p:spPr>
+        <p:txBody>
+          <a:bodyPr wrap="square" rtlCol="0">
+            <a:spAutoFit/>
+          </a:bodyPr>
+          <a:lstStyle/>
+          <a:p>
+            <a:pPr>
+              <a:lnSpc>
+                <a:spcPct val="150000"/>
+              </a:lnSpc>
+            </a:pPr>
+            <a:r>
+              <a:rPr lang="fr-FR" sz="2800" dirty="0"/>
+              <a:t>Article consacré entièrement à cet échange</a:t>
+            </a:r>
+          </a:p>
+          <a:p>
+            <a:pPr>
+              <a:lnSpc>
+                <a:spcPct val="150000"/>
+              </a:lnSpc>
+            </a:pPr>
+            <a:r>
+              <a:rPr lang="fr-FR" sz="2800" dirty="0"/>
+              <a:t>Entretien d’une heure avec l’association</a:t>
+            </a:r>
+          </a:p>
+          <a:p>
+            <a:pPr>
+              <a:lnSpc>
+                <a:spcPct val="150000"/>
+              </a:lnSpc>
+            </a:pPr>
+            <a:r>
+              <a:rPr lang="fr-FR" sz="2800" dirty="0"/>
+              <a:t>Soutenu par </a:t>
+            </a:r>
+            <a:r>
+              <a:rPr lang="fr-FR" sz="2800" dirty="0" err="1"/>
+              <a:t>Onlineformapro</a:t>
+            </a:r>
+            <a:endParaRPr lang="fr-FR" sz="2800" dirty="0"/>
           </a:p>
         </p:txBody>
       </p:sp>
     </p:spTree>
     <p:extLst>
       <p:ext uri="{BB962C8B-B14F-4D97-AF65-F5344CB8AC3E}">
-        <p14:creationId xmlns:p14="http://schemas.microsoft.com/office/powerpoint/2010/main" val="2916769470"/>
+        <p14:creationId xmlns:p14="http://schemas.microsoft.com/office/powerpoint/2010/main" val="588379275"/>
       </p:ext>
     </p:extLst>
   </p:cSld>
@@ -6071,8 +6201,8 @@
         </p:nvSpPr>
         <p:spPr>
           <a:xfrm>
-            <a:off x="-109959" y="207380"/>
-            <a:ext cx="12301958" cy="1015663"/>
+            <a:off x="1041208" y="113862"/>
+            <a:ext cx="10560626" cy="769441"/>
           </a:xfrm>
           <a:prstGeom prst="rect">
             <a:avLst/>
@@ -6087,8 +6217,310 @@
           <a:p>
             <a:pPr algn="ctr"/>
             <a:r>
-              <a:rPr lang="fr-FR" sz="6000" b="1" spc="600" dirty="0"/>
-              <a:t>Prototype</a:t>
+              <a:rPr lang="fr-FR" sz="4400" b="1" spc="600" dirty="0"/>
+              <a:t>Traducteur en LSF</a:t>
+            </a:r>
+          </a:p>
+        </p:txBody>
+      </p:sp>
+      <p:sp>
+        <p:nvSpPr>
+          <p:cNvPr id="10" name="ZoneTexte 9">
+            <a:extLst>
+              <a:ext uri="{FF2B5EF4-FFF2-40B4-BE49-F238E27FC236}">
+                <a16:creationId xmlns:a16="http://schemas.microsoft.com/office/drawing/2014/main" id="{341155E2-91B2-4427-904E-58E36A3B0210}"/>
+              </a:ext>
+            </a:extLst>
+          </p:cNvPr>
+          <p:cNvSpPr txBox="1"/>
+          <p:nvPr/>
+        </p:nvSpPr>
+        <p:spPr>
+          <a:xfrm>
+            <a:off x="4195271" y="1387956"/>
+            <a:ext cx="4339130" cy="1318181"/>
+          </a:xfrm>
+          <a:prstGeom prst="rect">
+            <a:avLst/>
+          </a:prstGeom>
+          <a:noFill/>
+        </p:spPr>
+        <p:txBody>
+          <a:bodyPr wrap="square" rtlCol="0">
+            <a:spAutoFit/>
+          </a:bodyPr>
+          <a:lstStyle/>
+          <a:p>
+            <a:pPr>
+              <a:lnSpc>
+                <a:spcPct val="150000"/>
+              </a:lnSpc>
+            </a:pPr>
+            <a:r>
+              <a:rPr lang="fr-FR" sz="2800" dirty="0"/>
+              <a:t>Une page du site dédiée à ça</a:t>
+            </a:r>
+          </a:p>
+          <a:p>
+            <a:pPr>
+              <a:lnSpc>
+                <a:spcPct val="150000"/>
+              </a:lnSpc>
+            </a:pPr>
+            <a:r>
+              <a:rPr lang="fr-FR" sz="2800" dirty="0"/>
+              <a:t>Intégré grâce à Javascript</a:t>
+            </a:r>
+          </a:p>
+        </p:txBody>
+      </p:sp>
+      <p:sp>
+        <p:nvSpPr>
+          <p:cNvPr id="3" name="Rectangle : coins arrondis 2">
+            <a:extLst>
+              <a:ext uri="{FF2B5EF4-FFF2-40B4-BE49-F238E27FC236}">
+                <a16:creationId xmlns:a16="http://schemas.microsoft.com/office/drawing/2014/main" id="{99A93A8E-97CA-42CB-8DB5-01BB1CDB957B}"/>
+              </a:ext>
+            </a:extLst>
+          </p:cNvPr>
+          <p:cNvSpPr/>
+          <p:nvPr/>
+        </p:nvSpPr>
+        <p:spPr>
+          <a:xfrm>
+            <a:off x="3523137" y="3210790"/>
+            <a:ext cx="6037119" cy="810491"/>
+          </a:xfrm>
+          <a:prstGeom prst="roundRect">
+            <a:avLst/>
+          </a:prstGeom>
+          <a:noFill/>
+          <a:ln w="19050">
+            <a:solidFill>
+              <a:srgbClr val="FF5600"/>
+            </a:solidFill>
+          </a:ln>
+        </p:spPr>
+        <p:style>
+          <a:lnRef idx="2">
+            <a:schemeClr val="accent1">
+              <a:shade val="50000"/>
+            </a:schemeClr>
+          </a:lnRef>
+          <a:fillRef idx="1">
+            <a:schemeClr val="accent1"/>
+          </a:fillRef>
+          <a:effectRef idx="0">
+            <a:schemeClr val="accent1"/>
+          </a:effectRef>
+          <a:fontRef idx="minor">
+            <a:schemeClr val="lt1"/>
+          </a:fontRef>
+        </p:style>
+        <p:txBody>
+          <a:bodyPr rtlCol="0" anchor="ctr"/>
+          <a:lstStyle/>
+          <a:p>
+            <a:pPr algn="ctr"/>
+            <a:endParaRPr lang="fr-FR">
+              <a:ln>
+                <a:solidFill>
+                  <a:srgbClr val="FF5600"/>
+                </a:solidFill>
+              </a:ln>
+              <a:noFill/>
+            </a:endParaRPr>
+          </a:p>
+        </p:txBody>
+      </p:sp>
+      <p:sp>
+        <p:nvSpPr>
+          <p:cNvPr id="11" name="Rectangle : coins arrondis 10">
+            <a:extLst>
+              <a:ext uri="{FF2B5EF4-FFF2-40B4-BE49-F238E27FC236}">
+                <a16:creationId xmlns:a16="http://schemas.microsoft.com/office/drawing/2014/main" id="{95B62A0E-33E3-4F8C-9881-40EF761AB1F9}"/>
+              </a:ext>
+            </a:extLst>
+          </p:cNvPr>
+          <p:cNvSpPr/>
+          <p:nvPr/>
+        </p:nvSpPr>
+        <p:spPr>
+          <a:xfrm>
+            <a:off x="8762176" y="3210789"/>
+            <a:ext cx="798080" cy="810491"/>
+          </a:xfrm>
+          <a:prstGeom prst="roundRect">
+            <a:avLst/>
+          </a:prstGeom>
+          <a:noFill/>
+          <a:ln w="19050">
+            <a:solidFill>
+              <a:srgbClr val="FF5600"/>
+            </a:solidFill>
+          </a:ln>
+        </p:spPr>
+        <p:style>
+          <a:lnRef idx="2">
+            <a:schemeClr val="accent1">
+              <a:shade val="50000"/>
+            </a:schemeClr>
+          </a:lnRef>
+          <a:fillRef idx="1">
+            <a:schemeClr val="accent1"/>
+          </a:fillRef>
+          <a:effectRef idx="0">
+            <a:schemeClr val="accent1"/>
+          </a:effectRef>
+          <a:fontRef idx="minor">
+            <a:schemeClr val="lt1"/>
+          </a:fontRef>
+        </p:style>
+        <p:txBody>
+          <a:bodyPr rtlCol="0" anchor="ctr"/>
+          <a:lstStyle/>
+          <a:p>
+            <a:pPr algn="ctr"/>
+            <a:endParaRPr lang="fr-FR">
+              <a:ln>
+                <a:solidFill>
+                  <a:srgbClr val="FF5600"/>
+                </a:solidFill>
+              </a:ln>
+              <a:noFill/>
+            </a:endParaRPr>
+          </a:p>
+        </p:txBody>
+      </p:sp>
+      <p:cxnSp>
+        <p:nvCxnSpPr>
+          <p:cNvPr id="12" name="Connecteur droit 11">
+            <a:extLst>
+              <a:ext uri="{FF2B5EF4-FFF2-40B4-BE49-F238E27FC236}">
+                <a16:creationId xmlns:a16="http://schemas.microsoft.com/office/drawing/2014/main" id="{E8A48B70-9AC3-4CF4-A717-D139BBD40BF4}"/>
+              </a:ext>
+            </a:extLst>
+          </p:cNvPr>
+          <p:cNvCxnSpPr/>
+          <p:nvPr/>
+        </p:nvCxnSpPr>
+        <p:spPr>
+          <a:xfrm flipV="1">
+            <a:off x="8863776" y="3635374"/>
+            <a:ext cx="269875" cy="269875"/>
+          </a:xfrm>
+          <a:prstGeom prst="line">
+            <a:avLst/>
+          </a:prstGeom>
+          <a:ln w="19050">
+            <a:solidFill>
+              <a:srgbClr val="FF5600"/>
+            </a:solidFill>
+          </a:ln>
+        </p:spPr>
+        <p:style>
+          <a:lnRef idx="1">
+            <a:schemeClr val="accent2"/>
+          </a:lnRef>
+          <a:fillRef idx="0">
+            <a:schemeClr val="accent2"/>
+          </a:fillRef>
+          <a:effectRef idx="0">
+            <a:schemeClr val="accent2"/>
+          </a:effectRef>
+          <a:fontRef idx="minor">
+            <a:schemeClr val="tx1"/>
+          </a:fontRef>
+        </p:style>
+      </p:cxnSp>
+      <p:sp>
+        <p:nvSpPr>
+          <p:cNvPr id="14" name="Ellipse 13">
+            <a:extLst>
+              <a:ext uri="{FF2B5EF4-FFF2-40B4-BE49-F238E27FC236}">
+                <a16:creationId xmlns:a16="http://schemas.microsoft.com/office/drawing/2014/main" id="{BC830C09-594F-4069-8225-EA3F9B821DA7}"/>
+              </a:ext>
+            </a:extLst>
+          </p:cNvPr>
+          <p:cNvSpPr/>
+          <p:nvPr/>
+        </p:nvSpPr>
+        <p:spPr>
+          <a:xfrm>
+            <a:off x="9071739" y="3314699"/>
+            <a:ext cx="368300" cy="368300"/>
+          </a:xfrm>
+          <a:prstGeom prst="ellipse">
+            <a:avLst/>
+          </a:prstGeom>
+          <a:noFill/>
+          <a:ln w="19050">
+            <a:solidFill>
+              <a:srgbClr val="FF5600"/>
+            </a:solidFill>
+          </a:ln>
+        </p:spPr>
+        <p:style>
+          <a:lnRef idx="2">
+            <a:schemeClr val="accent1">
+              <a:shade val="50000"/>
+            </a:schemeClr>
+          </a:lnRef>
+          <a:fillRef idx="1">
+            <a:schemeClr val="accent1"/>
+          </a:fillRef>
+          <a:effectRef idx="0">
+            <a:schemeClr val="accent1"/>
+          </a:effectRef>
+          <a:fontRef idx="minor">
+            <a:schemeClr val="lt1"/>
+          </a:fontRef>
+        </p:style>
+        <p:txBody>
+          <a:bodyPr rtlCol="0" anchor="ctr"/>
+          <a:lstStyle/>
+          <a:p>
+            <a:pPr algn="ctr"/>
+            <a:endParaRPr lang="fr-FR"/>
+          </a:p>
+        </p:txBody>
+      </p:sp>
+      <p:sp>
+        <p:nvSpPr>
+          <p:cNvPr id="15" name="ZoneTexte 14">
+            <a:extLst>
+              <a:ext uri="{FF2B5EF4-FFF2-40B4-BE49-F238E27FC236}">
+                <a16:creationId xmlns:a16="http://schemas.microsoft.com/office/drawing/2014/main" id="{0B863017-3107-4BAC-89D7-1874201DED24}"/>
+              </a:ext>
+            </a:extLst>
+          </p:cNvPr>
+          <p:cNvSpPr txBox="1"/>
+          <p:nvPr/>
+        </p:nvSpPr>
+        <p:spPr>
+          <a:xfrm>
+            <a:off x="9255889" y="6305105"/>
+            <a:ext cx="2713529" cy="464871"/>
+          </a:xfrm>
+          <a:prstGeom prst="rect">
+            <a:avLst/>
+          </a:prstGeom>
+          <a:noFill/>
+        </p:spPr>
+        <p:txBody>
+          <a:bodyPr wrap="square" rtlCol="0">
+            <a:spAutoFit/>
+          </a:bodyPr>
+          <a:lstStyle/>
+          <a:p>
+            <a:pPr>
+              <a:lnSpc>
+                <a:spcPct val="150000"/>
+              </a:lnSpc>
+            </a:pPr>
+            <a:r>
+              <a:rPr lang="fr-FR" dirty="0"/>
+              <a:t>Pas de scroll sur cette page</a:t>
             </a:r>
           </a:p>
         </p:txBody>
@@ -6096,7 +6528,7 @@
     </p:spTree>
     <p:extLst>
       <p:ext uri="{BB962C8B-B14F-4D97-AF65-F5344CB8AC3E}">
-        <p14:creationId xmlns:p14="http://schemas.microsoft.com/office/powerpoint/2010/main" val="1723833594"/>
+        <p14:creationId xmlns:p14="http://schemas.microsoft.com/office/powerpoint/2010/main" val="1668663310"/>
       </p:ext>
     </p:extLst>
   </p:cSld>
@@ -6534,8 +6966,8 @@
         </p:nvSpPr>
         <p:spPr>
           <a:xfrm>
-            <a:off x="-109959" y="207380"/>
-            <a:ext cx="12301958" cy="1015663"/>
+            <a:off x="1041208" y="113862"/>
+            <a:ext cx="10560626" cy="769441"/>
           </a:xfrm>
           <a:prstGeom prst="rect">
             <a:avLst/>
@@ -6550,8 +6982,609 @@
           <a:p>
             <a:pPr algn="ctr"/>
             <a:r>
-              <a:rPr lang="fr-FR" sz="6000" b="1" spc="600" dirty="0"/>
-              <a:t>Normes et législations</a:t>
+              <a:rPr lang="fr-FR" sz="4400" b="1" spc="600" dirty="0"/>
+              <a:t>Traducteur en LSF</a:t>
+            </a:r>
+          </a:p>
+        </p:txBody>
+      </p:sp>
+      <p:sp>
+        <p:nvSpPr>
+          <p:cNvPr id="3" name="Rectangle : coins arrondis 2">
+            <a:extLst>
+              <a:ext uri="{FF2B5EF4-FFF2-40B4-BE49-F238E27FC236}">
+                <a16:creationId xmlns:a16="http://schemas.microsoft.com/office/drawing/2014/main" id="{99A93A8E-97CA-42CB-8DB5-01BB1CDB957B}"/>
+              </a:ext>
+            </a:extLst>
+          </p:cNvPr>
+          <p:cNvSpPr/>
+          <p:nvPr/>
+        </p:nvSpPr>
+        <p:spPr>
+          <a:xfrm>
+            <a:off x="3523137" y="3210790"/>
+            <a:ext cx="6037119" cy="810491"/>
+          </a:xfrm>
+          <a:prstGeom prst="roundRect">
+            <a:avLst/>
+          </a:prstGeom>
+          <a:noFill/>
+          <a:ln w="19050">
+            <a:solidFill>
+              <a:srgbClr val="FF5600"/>
+            </a:solidFill>
+          </a:ln>
+        </p:spPr>
+        <p:style>
+          <a:lnRef idx="2">
+            <a:schemeClr val="accent1">
+              <a:shade val="50000"/>
+            </a:schemeClr>
+          </a:lnRef>
+          <a:fillRef idx="1">
+            <a:schemeClr val="accent1"/>
+          </a:fillRef>
+          <a:effectRef idx="0">
+            <a:schemeClr val="accent1"/>
+          </a:effectRef>
+          <a:fontRef idx="minor">
+            <a:schemeClr val="lt1"/>
+          </a:fontRef>
+        </p:style>
+        <p:txBody>
+          <a:bodyPr rtlCol="0" anchor="ctr"/>
+          <a:lstStyle/>
+          <a:p>
+            <a:pPr algn="ctr"/>
+            <a:endParaRPr lang="fr-FR">
+              <a:ln>
+                <a:solidFill>
+                  <a:srgbClr val="FF5600"/>
+                </a:solidFill>
+              </a:ln>
+              <a:noFill/>
+            </a:endParaRPr>
+          </a:p>
+        </p:txBody>
+      </p:sp>
+      <p:sp>
+        <p:nvSpPr>
+          <p:cNvPr id="11" name="Rectangle : coins arrondis 10">
+            <a:extLst>
+              <a:ext uri="{FF2B5EF4-FFF2-40B4-BE49-F238E27FC236}">
+                <a16:creationId xmlns:a16="http://schemas.microsoft.com/office/drawing/2014/main" id="{95B62A0E-33E3-4F8C-9881-40EF761AB1F9}"/>
+              </a:ext>
+            </a:extLst>
+          </p:cNvPr>
+          <p:cNvSpPr/>
+          <p:nvPr/>
+        </p:nvSpPr>
+        <p:spPr>
+          <a:xfrm>
+            <a:off x="8762176" y="3210789"/>
+            <a:ext cx="798080" cy="810491"/>
+          </a:xfrm>
+          <a:prstGeom prst="roundRect">
+            <a:avLst/>
+          </a:prstGeom>
+          <a:noFill/>
+          <a:ln w="19050">
+            <a:solidFill>
+              <a:srgbClr val="FF5600"/>
+            </a:solidFill>
+          </a:ln>
+        </p:spPr>
+        <p:style>
+          <a:lnRef idx="2">
+            <a:schemeClr val="accent1">
+              <a:shade val="50000"/>
+            </a:schemeClr>
+          </a:lnRef>
+          <a:fillRef idx="1">
+            <a:schemeClr val="accent1"/>
+          </a:fillRef>
+          <a:effectRef idx="0">
+            <a:schemeClr val="accent1"/>
+          </a:effectRef>
+          <a:fontRef idx="minor">
+            <a:schemeClr val="lt1"/>
+          </a:fontRef>
+        </p:style>
+        <p:txBody>
+          <a:bodyPr rtlCol="0" anchor="ctr"/>
+          <a:lstStyle/>
+          <a:p>
+            <a:pPr algn="ctr"/>
+            <a:endParaRPr lang="fr-FR">
+              <a:ln>
+                <a:solidFill>
+                  <a:srgbClr val="FF5600"/>
+                </a:solidFill>
+              </a:ln>
+              <a:noFill/>
+            </a:endParaRPr>
+          </a:p>
+        </p:txBody>
+      </p:sp>
+      <p:cxnSp>
+        <p:nvCxnSpPr>
+          <p:cNvPr id="12" name="Connecteur droit 11">
+            <a:extLst>
+              <a:ext uri="{FF2B5EF4-FFF2-40B4-BE49-F238E27FC236}">
+                <a16:creationId xmlns:a16="http://schemas.microsoft.com/office/drawing/2014/main" id="{E8A48B70-9AC3-4CF4-A717-D139BBD40BF4}"/>
+              </a:ext>
+            </a:extLst>
+          </p:cNvPr>
+          <p:cNvCxnSpPr/>
+          <p:nvPr/>
+        </p:nvCxnSpPr>
+        <p:spPr>
+          <a:xfrm flipV="1">
+            <a:off x="8863776" y="3635374"/>
+            <a:ext cx="269875" cy="269875"/>
+          </a:xfrm>
+          <a:prstGeom prst="line">
+            <a:avLst/>
+          </a:prstGeom>
+          <a:ln w="19050">
+            <a:solidFill>
+              <a:srgbClr val="FF5600"/>
+            </a:solidFill>
+          </a:ln>
+        </p:spPr>
+        <p:style>
+          <a:lnRef idx="1">
+            <a:schemeClr val="accent2"/>
+          </a:lnRef>
+          <a:fillRef idx="0">
+            <a:schemeClr val="accent2"/>
+          </a:fillRef>
+          <a:effectRef idx="0">
+            <a:schemeClr val="accent2"/>
+          </a:effectRef>
+          <a:fontRef idx="minor">
+            <a:schemeClr val="tx1"/>
+          </a:fontRef>
+        </p:style>
+      </p:cxnSp>
+      <p:sp>
+        <p:nvSpPr>
+          <p:cNvPr id="14" name="Ellipse 13">
+            <a:extLst>
+              <a:ext uri="{FF2B5EF4-FFF2-40B4-BE49-F238E27FC236}">
+                <a16:creationId xmlns:a16="http://schemas.microsoft.com/office/drawing/2014/main" id="{BC830C09-594F-4069-8225-EA3F9B821DA7}"/>
+              </a:ext>
+            </a:extLst>
+          </p:cNvPr>
+          <p:cNvSpPr/>
+          <p:nvPr/>
+        </p:nvSpPr>
+        <p:spPr>
+          <a:xfrm>
+            <a:off x="9071739" y="3314699"/>
+            <a:ext cx="368300" cy="368300"/>
+          </a:xfrm>
+          <a:prstGeom prst="ellipse">
+            <a:avLst/>
+          </a:prstGeom>
+          <a:noFill/>
+          <a:ln w="19050">
+            <a:solidFill>
+              <a:srgbClr val="FF5600"/>
+            </a:solidFill>
+          </a:ln>
+        </p:spPr>
+        <p:style>
+          <a:lnRef idx="2">
+            <a:schemeClr val="accent1">
+              <a:shade val="50000"/>
+            </a:schemeClr>
+          </a:lnRef>
+          <a:fillRef idx="1">
+            <a:schemeClr val="accent1"/>
+          </a:fillRef>
+          <a:effectRef idx="0">
+            <a:schemeClr val="accent1"/>
+          </a:effectRef>
+          <a:fontRef idx="minor">
+            <a:schemeClr val="lt1"/>
+          </a:fontRef>
+        </p:style>
+        <p:txBody>
+          <a:bodyPr rtlCol="0" anchor="ctr"/>
+          <a:lstStyle/>
+          <a:p>
+            <a:pPr algn="ctr"/>
+            <a:endParaRPr lang="fr-FR"/>
+          </a:p>
+        </p:txBody>
+      </p:sp>
+      <p:sp>
+        <p:nvSpPr>
+          <p:cNvPr id="4" name="ZoneTexte 3">
+            <a:extLst>
+              <a:ext uri="{FF2B5EF4-FFF2-40B4-BE49-F238E27FC236}">
+                <a16:creationId xmlns:a16="http://schemas.microsoft.com/office/drawing/2014/main" id="{E619CA41-FD98-43A8-AF02-482C9FA8CEB8}"/>
+              </a:ext>
+            </a:extLst>
+          </p:cNvPr>
+          <p:cNvSpPr txBox="1"/>
+          <p:nvPr/>
+        </p:nvSpPr>
+        <p:spPr>
+          <a:xfrm>
+            <a:off x="3777072" y="3168069"/>
+            <a:ext cx="2514600" cy="923330"/>
+          </a:xfrm>
+          <a:prstGeom prst="rect">
+            <a:avLst/>
+          </a:prstGeom>
+          <a:noFill/>
+        </p:spPr>
+        <p:txBody>
+          <a:bodyPr wrap="square" rtlCol="0">
+            <a:spAutoFit/>
+          </a:bodyPr>
+          <a:lstStyle/>
+          <a:p>
+            <a:r>
+              <a:rPr lang="fr-FR" sz="5400" dirty="0"/>
+              <a:t>LSF</a:t>
+            </a:r>
+          </a:p>
+        </p:txBody>
+      </p:sp>
+      <p:pic>
+        <p:nvPicPr>
+          <p:cNvPr id="7" name="Image 6">
+            <a:extLst>
+              <a:ext uri="{FF2B5EF4-FFF2-40B4-BE49-F238E27FC236}">
+                <a16:creationId xmlns:a16="http://schemas.microsoft.com/office/drawing/2014/main" id="{8E7C64F2-2982-407D-965F-A2FEEF46AFA0}"/>
+              </a:ext>
+            </a:extLst>
+          </p:cNvPr>
+          <p:cNvPicPr>
+            <a:picLocks noChangeAspect="1"/>
+          </p:cNvPicPr>
+          <p:nvPr/>
+        </p:nvPicPr>
+        <p:blipFill>
+          <a:blip r:embed="rId3">
+            <a:extLst>
+              <a:ext uri="{28A0092B-C50C-407E-A947-70E740481C1C}">
+                <a14:useLocalDpi xmlns:a14="http://schemas.microsoft.com/office/drawing/2010/main" val="0"/>
+              </a:ext>
+            </a:extLst>
+          </a:blip>
+          <a:stretch>
+            <a:fillRect/>
+          </a:stretch>
+        </p:blipFill>
+        <p:spPr>
+          <a:xfrm>
+            <a:off x="4923151" y="4388167"/>
+            <a:ext cx="1128451" cy="1581479"/>
+          </a:xfrm>
+          <a:prstGeom prst="rect">
+            <a:avLst/>
+          </a:prstGeom>
+        </p:spPr>
+      </p:pic>
+      <p:pic>
+        <p:nvPicPr>
+          <p:cNvPr id="16" name="Image 15">
+            <a:extLst>
+              <a:ext uri="{FF2B5EF4-FFF2-40B4-BE49-F238E27FC236}">
+                <a16:creationId xmlns:a16="http://schemas.microsoft.com/office/drawing/2014/main" id="{1AB42330-BC28-4A02-B063-AFBB6BC0ABD6}"/>
+              </a:ext>
+            </a:extLst>
+          </p:cNvPr>
+          <p:cNvPicPr>
+            <a:picLocks noChangeAspect="1"/>
+          </p:cNvPicPr>
+          <p:nvPr/>
+        </p:nvPicPr>
+        <p:blipFill>
+          <a:blip r:embed="rId4">
+            <a:extLst>
+              <a:ext uri="{28A0092B-C50C-407E-A947-70E740481C1C}">
+                <a14:useLocalDpi xmlns:a14="http://schemas.microsoft.com/office/drawing/2010/main" val="0"/>
+              </a:ext>
+            </a:extLst>
+          </a:blip>
+          <a:stretch>
+            <a:fillRect/>
+          </a:stretch>
+        </p:blipFill>
+        <p:spPr>
+          <a:xfrm>
+            <a:off x="6051602" y="4388167"/>
+            <a:ext cx="980188" cy="1540295"/>
+          </a:xfrm>
+          <a:prstGeom prst="rect">
+            <a:avLst/>
+          </a:prstGeom>
+        </p:spPr>
+      </p:pic>
+      <p:pic>
+        <p:nvPicPr>
+          <p:cNvPr id="18" name="Image 17">
+            <a:extLst>
+              <a:ext uri="{FF2B5EF4-FFF2-40B4-BE49-F238E27FC236}">
+                <a16:creationId xmlns:a16="http://schemas.microsoft.com/office/drawing/2014/main" id="{6081E698-1FB8-41F6-B745-C883BE2F8A05}"/>
+              </a:ext>
+            </a:extLst>
+          </p:cNvPr>
+          <p:cNvPicPr>
+            <a:picLocks noChangeAspect="1"/>
+          </p:cNvPicPr>
+          <p:nvPr/>
+        </p:nvPicPr>
+        <p:blipFill>
+          <a:blip r:embed="rId5">
+            <a:extLst>
+              <a:ext uri="{28A0092B-C50C-407E-A947-70E740481C1C}">
+                <a14:useLocalDpi xmlns:a14="http://schemas.microsoft.com/office/drawing/2010/main" val="0"/>
+              </a:ext>
+            </a:extLst>
+          </a:blip>
+          <a:stretch>
+            <a:fillRect/>
+          </a:stretch>
+        </p:blipFill>
+        <p:spPr>
+          <a:xfrm>
+            <a:off x="7076184" y="4330246"/>
+            <a:ext cx="1004898" cy="1614427"/>
+          </a:xfrm>
+          <a:prstGeom prst="rect">
+            <a:avLst/>
+          </a:prstGeom>
+        </p:spPr>
+      </p:pic>
+      <p:sp>
+        <p:nvSpPr>
+          <p:cNvPr id="19" name="Rectangle 18">
+            <a:extLst>
+              <a:ext uri="{FF2B5EF4-FFF2-40B4-BE49-F238E27FC236}">
+                <a16:creationId xmlns:a16="http://schemas.microsoft.com/office/drawing/2014/main" id="{313CFCBD-6F7E-41FA-B4D9-0E25815469CB}"/>
+              </a:ext>
+            </a:extLst>
+          </p:cNvPr>
+          <p:cNvSpPr/>
+          <p:nvPr/>
+        </p:nvSpPr>
+        <p:spPr>
+          <a:xfrm>
+            <a:off x="5583635" y="5657850"/>
+            <a:ext cx="407095" cy="384912"/>
+          </a:xfrm>
+          <a:prstGeom prst="rect">
+            <a:avLst/>
+          </a:prstGeom>
+          <a:solidFill>
+            <a:schemeClr val="bg1"/>
+          </a:solidFill>
+          <a:ln>
+            <a:noFill/>
+          </a:ln>
+        </p:spPr>
+        <p:style>
+          <a:lnRef idx="2">
+            <a:schemeClr val="accent1">
+              <a:shade val="50000"/>
+            </a:schemeClr>
+          </a:lnRef>
+          <a:fillRef idx="1">
+            <a:schemeClr val="accent1"/>
+          </a:fillRef>
+          <a:effectRef idx="0">
+            <a:schemeClr val="accent1"/>
+          </a:effectRef>
+          <a:fontRef idx="minor">
+            <a:schemeClr val="lt1"/>
+          </a:fontRef>
+        </p:style>
+        <p:txBody>
+          <a:bodyPr rtlCol="0" anchor="ctr"/>
+          <a:lstStyle/>
+          <a:p>
+            <a:pPr algn="ctr"/>
+            <a:endParaRPr lang="fr-FR"/>
+          </a:p>
+        </p:txBody>
+      </p:sp>
+      <p:sp>
+        <p:nvSpPr>
+          <p:cNvPr id="20" name="Rectangle 19">
+            <a:extLst>
+              <a:ext uri="{FF2B5EF4-FFF2-40B4-BE49-F238E27FC236}">
+                <a16:creationId xmlns:a16="http://schemas.microsoft.com/office/drawing/2014/main" id="{B25FB80F-8EFD-4515-94F0-08CDF15678D7}"/>
+              </a:ext>
+            </a:extLst>
+          </p:cNvPr>
+          <p:cNvSpPr/>
+          <p:nvPr/>
+        </p:nvSpPr>
+        <p:spPr>
+          <a:xfrm>
+            <a:off x="6806137" y="5525146"/>
+            <a:ext cx="407095" cy="384912"/>
+          </a:xfrm>
+          <a:prstGeom prst="rect">
+            <a:avLst/>
+          </a:prstGeom>
+          <a:solidFill>
+            <a:schemeClr val="bg1"/>
+          </a:solidFill>
+          <a:ln>
+            <a:noFill/>
+          </a:ln>
+        </p:spPr>
+        <p:style>
+          <a:lnRef idx="2">
+            <a:schemeClr val="accent1">
+              <a:shade val="50000"/>
+            </a:schemeClr>
+          </a:lnRef>
+          <a:fillRef idx="1">
+            <a:schemeClr val="accent1"/>
+          </a:fillRef>
+          <a:effectRef idx="0">
+            <a:schemeClr val="accent1"/>
+          </a:effectRef>
+          <a:fontRef idx="minor">
+            <a:schemeClr val="lt1"/>
+          </a:fontRef>
+        </p:style>
+        <p:txBody>
+          <a:bodyPr rtlCol="0" anchor="ctr"/>
+          <a:lstStyle/>
+          <a:p>
+            <a:pPr algn="ctr"/>
+            <a:endParaRPr lang="fr-FR"/>
+          </a:p>
+        </p:txBody>
+      </p:sp>
+      <p:sp>
+        <p:nvSpPr>
+          <p:cNvPr id="21" name="Rectangle 20">
+            <a:extLst>
+              <a:ext uri="{FF2B5EF4-FFF2-40B4-BE49-F238E27FC236}">
+                <a16:creationId xmlns:a16="http://schemas.microsoft.com/office/drawing/2014/main" id="{F67FC954-624C-4D30-B4FF-FC1CC2470762}"/>
+              </a:ext>
+            </a:extLst>
+          </p:cNvPr>
+          <p:cNvSpPr/>
+          <p:nvPr/>
+        </p:nvSpPr>
+        <p:spPr>
+          <a:xfrm>
+            <a:off x="7789005" y="5559761"/>
+            <a:ext cx="407095" cy="384912"/>
+          </a:xfrm>
+          <a:prstGeom prst="rect">
+            <a:avLst/>
+          </a:prstGeom>
+          <a:solidFill>
+            <a:schemeClr val="bg1"/>
+          </a:solidFill>
+          <a:ln>
+            <a:noFill/>
+          </a:ln>
+        </p:spPr>
+        <p:style>
+          <a:lnRef idx="2">
+            <a:schemeClr val="accent1">
+              <a:shade val="50000"/>
+            </a:schemeClr>
+          </a:lnRef>
+          <a:fillRef idx="1">
+            <a:schemeClr val="accent1"/>
+          </a:fillRef>
+          <a:effectRef idx="0">
+            <a:schemeClr val="accent1"/>
+          </a:effectRef>
+          <a:fontRef idx="minor">
+            <a:schemeClr val="lt1"/>
+          </a:fontRef>
+        </p:style>
+        <p:txBody>
+          <a:bodyPr rtlCol="0" anchor="ctr"/>
+          <a:lstStyle/>
+          <a:p>
+            <a:pPr algn="ctr"/>
+            <a:endParaRPr lang="fr-FR"/>
+          </a:p>
+        </p:txBody>
+      </p:sp>
+      <p:sp>
+        <p:nvSpPr>
+          <p:cNvPr id="22" name="ZoneTexte 21">
+            <a:extLst>
+              <a:ext uri="{FF2B5EF4-FFF2-40B4-BE49-F238E27FC236}">
+                <a16:creationId xmlns:a16="http://schemas.microsoft.com/office/drawing/2014/main" id="{E0AB63A6-B148-4E66-9509-54407AA8357A}"/>
+              </a:ext>
+            </a:extLst>
+          </p:cNvPr>
+          <p:cNvSpPr txBox="1"/>
+          <p:nvPr/>
+        </p:nvSpPr>
+        <p:spPr>
+          <a:xfrm>
+            <a:off x="4195271" y="1387956"/>
+            <a:ext cx="4339130" cy="1318181"/>
+          </a:xfrm>
+          <a:prstGeom prst="rect">
+            <a:avLst/>
+          </a:prstGeom>
+          <a:noFill/>
+        </p:spPr>
+        <p:txBody>
+          <a:bodyPr wrap="square" rtlCol="0">
+            <a:spAutoFit/>
+          </a:bodyPr>
+          <a:lstStyle/>
+          <a:p>
+            <a:pPr>
+              <a:lnSpc>
+                <a:spcPct val="150000"/>
+              </a:lnSpc>
+            </a:pPr>
+            <a:r>
+              <a:rPr lang="fr-FR" sz="2800" dirty="0"/>
+              <a:t>Une page du site dédiée à ça</a:t>
+            </a:r>
+          </a:p>
+          <a:p>
+            <a:pPr>
+              <a:lnSpc>
+                <a:spcPct val="150000"/>
+              </a:lnSpc>
+            </a:pPr>
+            <a:r>
+              <a:rPr lang="fr-FR" sz="2800" dirty="0"/>
+              <a:t>Intégré grâce à Javascript</a:t>
+            </a:r>
+          </a:p>
+        </p:txBody>
+      </p:sp>
+      <p:sp>
+        <p:nvSpPr>
+          <p:cNvPr id="23" name="ZoneTexte 22">
+            <a:extLst>
+              <a:ext uri="{FF2B5EF4-FFF2-40B4-BE49-F238E27FC236}">
+                <a16:creationId xmlns:a16="http://schemas.microsoft.com/office/drawing/2014/main" id="{47999826-826B-47F8-87A0-3984D0AA91C3}"/>
+              </a:ext>
+            </a:extLst>
+          </p:cNvPr>
+          <p:cNvSpPr txBox="1"/>
+          <p:nvPr/>
+        </p:nvSpPr>
+        <p:spPr>
+          <a:xfrm>
+            <a:off x="9255889" y="6305105"/>
+            <a:ext cx="2713529" cy="464871"/>
+          </a:xfrm>
+          <a:prstGeom prst="rect">
+            <a:avLst/>
+          </a:prstGeom>
+          <a:noFill/>
+        </p:spPr>
+        <p:txBody>
+          <a:bodyPr wrap="square" rtlCol="0">
+            <a:spAutoFit/>
+          </a:bodyPr>
+          <a:lstStyle/>
+          <a:p>
+            <a:pPr>
+              <a:lnSpc>
+                <a:spcPct val="150000"/>
+              </a:lnSpc>
+            </a:pPr>
+            <a:r>
+              <a:rPr lang="fr-FR" dirty="0"/>
+              <a:t>Pas de scroll sur cette page</a:t>
             </a:r>
           </a:p>
         </p:txBody>
@@ -6559,7 +7592,7 @@
     </p:spTree>
     <p:extLst>
       <p:ext uri="{BB962C8B-B14F-4D97-AF65-F5344CB8AC3E}">
-        <p14:creationId xmlns:p14="http://schemas.microsoft.com/office/powerpoint/2010/main" val="4060428811"/>
+        <p14:creationId xmlns:p14="http://schemas.microsoft.com/office/powerpoint/2010/main" val="2125939575"/>
       </p:ext>
     </p:extLst>
   </p:cSld>
@@ -7014,195 +8047,15 @@
             <a:pPr algn="ctr"/>
             <a:r>
               <a:rPr lang="fr-FR" sz="6000" b="1" spc="600" dirty="0"/>
-              <a:t>Technologies</a:t>
+              <a:t>Wireframe</a:t>
             </a:r>
           </a:p>
         </p:txBody>
       </p:sp>
-      <p:pic>
-        <p:nvPicPr>
-          <p:cNvPr id="4" name="Image 3">
-            <a:extLst>
-              <a:ext uri="{FF2B5EF4-FFF2-40B4-BE49-F238E27FC236}">
-                <a16:creationId xmlns:a16="http://schemas.microsoft.com/office/drawing/2014/main" id="{6F697742-2EDE-424E-8575-44620DBD2DCC}"/>
-              </a:ext>
-            </a:extLst>
-          </p:cNvPr>
-          <p:cNvPicPr>
-            <a:picLocks noChangeAspect="1"/>
-          </p:cNvPicPr>
-          <p:nvPr/>
-        </p:nvPicPr>
-        <p:blipFill>
-          <a:blip r:embed="rId3">
-            <a:extLst>
-              <a:ext uri="{28A0092B-C50C-407E-A947-70E740481C1C}">
-                <a14:useLocalDpi xmlns:a14="http://schemas.microsoft.com/office/drawing/2010/main" val="0"/>
-              </a:ext>
-            </a:extLst>
-          </a:blip>
-          <a:stretch>
-            <a:fillRect/>
-          </a:stretch>
-        </p:blipFill>
-        <p:spPr>
-          <a:xfrm>
-            <a:off x="3251841" y="3943265"/>
-            <a:ext cx="3815167" cy="2331491"/>
-          </a:xfrm>
-          <a:prstGeom prst="rect">
-            <a:avLst/>
-          </a:prstGeom>
-        </p:spPr>
-      </p:pic>
-      <p:pic>
-        <p:nvPicPr>
-          <p:cNvPr id="7" name="Image 6">
-            <a:extLst>
-              <a:ext uri="{FF2B5EF4-FFF2-40B4-BE49-F238E27FC236}">
-                <a16:creationId xmlns:a16="http://schemas.microsoft.com/office/drawing/2014/main" id="{55BA3968-FA82-4236-889F-1FAACC376421}"/>
-              </a:ext>
-            </a:extLst>
-          </p:cNvPr>
-          <p:cNvPicPr>
-            <a:picLocks noChangeAspect="1"/>
-          </p:cNvPicPr>
-          <p:nvPr/>
-        </p:nvPicPr>
-        <p:blipFill>
-          <a:blip r:embed="rId4">
-            <a:extLst>
-              <a:ext uri="{28A0092B-C50C-407E-A947-70E740481C1C}">
-                <a14:useLocalDpi xmlns:a14="http://schemas.microsoft.com/office/drawing/2010/main" val="0"/>
-              </a:ext>
-            </a:extLst>
-          </a:blip>
-          <a:stretch>
-            <a:fillRect/>
-          </a:stretch>
-        </p:blipFill>
-        <p:spPr>
-          <a:xfrm>
-            <a:off x="7379998" y="4015947"/>
-            <a:ext cx="1549528" cy="2186126"/>
-          </a:xfrm>
-          <a:prstGeom prst="rect">
-            <a:avLst/>
-          </a:prstGeom>
-        </p:spPr>
-      </p:pic>
-      <p:pic>
-        <p:nvPicPr>
-          <p:cNvPr id="11" name="Image 10">
-            <a:extLst>
-              <a:ext uri="{FF2B5EF4-FFF2-40B4-BE49-F238E27FC236}">
-                <a16:creationId xmlns:a16="http://schemas.microsoft.com/office/drawing/2014/main" id="{B82DEBC0-332E-45A3-9415-1E91252F8EFE}"/>
-              </a:ext>
-            </a:extLst>
-          </p:cNvPr>
-          <p:cNvPicPr>
-            <a:picLocks noChangeAspect="1"/>
-          </p:cNvPicPr>
-          <p:nvPr/>
-        </p:nvPicPr>
-        <p:blipFill>
-          <a:blip r:embed="rId5">
-            <a:extLst>
-              <a:ext uri="{28A0092B-C50C-407E-A947-70E740481C1C}">
-                <a14:useLocalDpi xmlns:a14="http://schemas.microsoft.com/office/drawing/2010/main" val="0"/>
-              </a:ext>
-            </a:extLst>
-          </a:blip>
-          <a:stretch>
-            <a:fillRect/>
-          </a:stretch>
-        </p:blipFill>
-        <p:spPr>
-          <a:xfrm>
-            <a:off x="5159425" y="1772006"/>
-            <a:ext cx="1763190" cy="1763190"/>
-          </a:xfrm>
-          <a:prstGeom prst="rect">
-            <a:avLst/>
-          </a:prstGeom>
-        </p:spPr>
-      </p:pic>
-      <p:pic>
-        <p:nvPicPr>
-          <p:cNvPr id="14" name="Image 13">
-            <a:extLst>
-              <a:ext uri="{FF2B5EF4-FFF2-40B4-BE49-F238E27FC236}">
-                <a16:creationId xmlns:a16="http://schemas.microsoft.com/office/drawing/2014/main" id="{EB189462-56B9-4709-BA4D-0861EB8CA1BA}"/>
-              </a:ext>
-            </a:extLst>
-          </p:cNvPr>
-          <p:cNvPicPr>
-            <a:picLocks noChangeAspect="1"/>
-          </p:cNvPicPr>
-          <p:nvPr/>
-        </p:nvPicPr>
-        <p:blipFill>
-          <a:blip r:embed="rId6">
-            <a:extLst>
-              <a:ext uri="{28A0092B-C50C-407E-A947-70E740481C1C}">
-                <a14:useLocalDpi xmlns:a14="http://schemas.microsoft.com/office/drawing/2010/main" val="0"/>
-              </a:ext>
-            </a:extLst>
-          </a:blip>
-          <a:stretch>
-            <a:fillRect/>
-          </a:stretch>
-        </p:blipFill>
-        <p:spPr>
-          <a:xfrm>
-            <a:off x="3024533" y="1686755"/>
-            <a:ext cx="1936030" cy="1936030"/>
-          </a:xfrm>
-          <a:prstGeom prst="rect">
-            <a:avLst/>
-          </a:prstGeom>
-        </p:spPr>
-      </p:pic>
-      <p:pic>
-        <p:nvPicPr>
-          <p:cNvPr id="5" name="Image 4">
-            <a:extLst>
-              <a:ext uri="{FF2B5EF4-FFF2-40B4-BE49-F238E27FC236}">
-                <a16:creationId xmlns:a16="http://schemas.microsoft.com/office/drawing/2014/main" id="{569166A0-CC58-4D5C-BB99-4C889876C6AB}"/>
-              </a:ext>
-            </a:extLst>
-          </p:cNvPr>
-          <p:cNvPicPr>
-            <a:picLocks noChangeAspect="1"/>
-          </p:cNvPicPr>
-          <p:nvPr/>
-        </p:nvPicPr>
-        <p:blipFill>
-          <a:blip r:embed="rId7">
-            <a:extLst>
-              <a:ext uri="{28A0092B-C50C-407E-A947-70E740481C1C}">
-                <a14:useLocalDpi xmlns:a14="http://schemas.microsoft.com/office/drawing/2010/main" val="0"/>
-              </a:ext>
-            </a:extLst>
-          </a:blip>
-          <a:stretch>
-            <a:fillRect/>
-          </a:stretch>
-        </p:blipFill>
-        <p:spPr>
-          <a:xfrm>
-            <a:off x="7567032" y="1772005"/>
-            <a:ext cx="1175461" cy="1763191"/>
-          </a:xfrm>
-          <a:prstGeom prst="rect">
-            <a:avLst/>
-          </a:prstGeom>
-        </p:spPr>
-      </p:pic>
     </p:spTree>
     <p:extLst>
       <p:ext uri="{BB962C8B-B14F-4D97-AF65-F5344CB8AC3E}">
-        <p14:creationId xmlns:p14="http://schemas.microsoft.com/office/powerpoint/2010/main" val="94616276"/>
+        <p14:creationId xmlns:p14="http://schemas.microsoft.com/office/powerpoint/2010/main" val="98831832"/>
       </p:ext>
     </p:extLst>
   </p:cSld>
@@ -7657,17 +8510,444 @@
             <a:pPr algn="ctr"/>
             <a:r>
               <a:rPr lang="fr-FR" sz="6000" b="1" spc="600" dirty="0"/>
-              <a:t>Référencement naturel</a:t>
+              <a:t>Maquette</a:t>
             </a:r>
           </a:p>
         </p:txBody>
       </p:sp>
-      <p:sp>
-        <p:nvSpPr>
-          <p:cNvPr id="7" name="ZoneTexte 6">
-            <a:extLst>
-              <a:ext uri="{FF2B5EF4-FFF2-40B4-BE49-F238E27FC236}">
-                <a16:creationId xmlns:a16="http://schemas.microsoft.com/office/drawing/2014/main" id="{B381BF07-8636-4637-85CE-E31B37280C45}"/>
+    </p:spTree>
+    <p:extLst>
+      <p:ext uri="{BB962C8B-B14F-4D97-AF65-F5344CB8AC3E}">
+        <p14:creationId xmlns:p14="http://schemas.microsoft.com/office/powerpoint/2010/main" val="2916769470"/>
+      </p:ext>
+    </p:extLst>
+  </p:cSld>
+  <p:clrMapOvr>
+    <a:masterClrMapping/>
+  </p:clrMapOvr>
+</p:sld>
+</file>
+
+<file path=ppt/slides/slide18.xml><?xml version="1.0" encoding="utf-8"?>
+<p:sld xmlns:a="http://schemas.openxmlformats.org/drawingml/2006/main" xmlns:r="http://schemas.openxmlformats.org/officeDocument/2006/relationships" xmlns:p="http://schemas.openxmlformats.org/presentationml/2006/main">
+  <p:cSld>
+    <p:spTree>
+      <p:nvGrpSpPr>
+        <p:cNvPr id="1" name=""/>
+        <p:cNvGrpSpPr/>
+        <p:nvPr/>
+      </p:nvGrpSpPr>
+      <p:grpSpPr>
+        <a:xfrm>
+          <a:off x="0" y="0"/>
+          <a:ext cx="0" cy="0"/>
+          <a:chOff x="0" y="0"/>
+          <a:chExt cx="0" cy="0"/>
+        </a:xfrm>
+      </p:grpSpPr>
+      <p:sp>
+        <p:nvSpPr>
+          <p:cNvPr id="6" name="Forme libre : forme 5">
+            <a:extLst>
+              <a:ext uri="{FF2B5EF4-FFF2-40B4-BE49-F238E27FC236}">
+                <a16:creationId xmlns:a16="http://schemas.microsoft.com/office/drawing/2014/main" id="{241A3761-269D-42AC-9090-FF44C3F3F66B}"/>
+              </a:ext>
+            </a:extLst>
+          </p:cNvPr>
+          <p:cNvSpPr/>
+          <p:nvPr/>
+        </p:nvSpPr>
+        <p:spPr>
+          <a:xfrm>
+            <a:off x="-46299" y="-57873"/>
+            <a:ext cx="2650603" cy="6944810"/>
+          </a:xfrm>
+          <a:custGeom>
+            <a:avLst/>
+            <a:gdLst>
+              <a:gd name="connsiteX0" fmla="*/ 0 w 2650603"/>
+              <a:gd name="connsiteY0" fmla="*/ 11574 h 6944810"/>
+              <a:gd name="connsiteX1" fmla="*/ 11575 w 2650603"/>
+              <a:gd name="connsiteY1" fmla="*/ 6944810 h 6944810"/>
+              <a:gd name="connsiteX2" fmla="*/ 2650603 w 2650603"/>
+              <a:gd name="connsiteY2" fmla="*/ 6944810 h 6944810"/>
+              <a:gd name="connsiteX3" fmla="*/ 1169043 w 2650603"/>
+              <a:gd name="connsiteY3" fmla="*/ 2951544 h 6944810"/>
+              <a:gd name="connsiteX4" fmla="*/ 532436 w 2650603"/>
+              <a:gd name="connsiteY4" fmla="*/ 0 h 6944810"/>
+              <a:gd name="connsiteX5" fmla="*/ 0 w 2650603"/>
+              <a:gd name="connsiteY5" fmla="*/ 11574 h 6944810"/>
+            </a:gdLst>
+            <a:ahLst/>
+            <a:cxnLst>
+              <a:cxn ang="0">
+                <a:pos x="connsiteX0" y="connsiteY0"/>
+              </a:cxn>
+              <a:cxn ang="0">
+                <a:pos x="connsiteX1" y="connsiteY1"/>
+              </a:cxn>
+              <a:cxn ang="0">
+                <a:pos x="connsiteX2" y="connsiteY2"/>
+              </a:cxn>
+              <a:cxn ang="0">
+                <a:pos x="connsiteX3" y="connsiteY3"/>
+              </a:cxn>
+              <a:cxn ang="0">
+                <a:pos x="connsiteX4" y="connsiteY4"/>
+              </a:cxn>
+              <a:cxn ang="0">
+                <a:pos x="connsiteX5" y="connsiteY5"/>
+              </a:cxn>
+            </a:cxnLst>
+            <a:rect l="l" t="t" r="r" b="b"/>
+            <a:pathLst>
+              <a:path w="2650603" h="6944810">
+                <a:moveTo>
+                  <a:pt x="0" y="11574"/>
+                </a:moveTo>
+                <a:cubicBezTo>
+                  <a:pt x="3858" y="2322653"/>
+                  <a:pt x="7717" y="4633731"/>
+                  <a:pt x="11575" y="6944810"/>
+                </a:cubicBezTo>
+                <a:lnTo>
+                  <a:pt x="2650603" y="6944810"/>
+                </a:lnTo>
+                <a:lnTo>
+                  <a:pt x="1169043" y="2951544"/>
+                </a:lnTo>
+                <a:lnTo>
+                  <a:pt x="532436" y="0"/>
+                </a:lnTo>
+                <a:lnTo>
+                  <a:pt x="0" y="11574"/>
+                </a:lnTo>
+                <a:close/>
+              </a:path>
+            </a:pathLst>
+          </a:custGeom>
+          <a:solidFill>
+            <a:srgbClr val="FF5600">
+              <a:alpha val="60000"/>
+            </a:srgbClr>
+          </a:solidFill>
+          <a:ln>
+            <a:noFill/>
+          </a:ln>
+        </p:spPr>
+        <p:style>
+          <a:lnRef idx="2">
+            <a:schemeClr val="accent1">
+              <a:shade val="50000"/>
+            </a:schemeClr>
+          </a:lnRef>
+          <a:fillRef idx="1">
+            <a:schemeClr val="accent1"/>
+          </a:fillRef>
+          <a:effectRef idx="0">
+            <a:schemeClr val="accent1"/>
+          </a:effectRef>
+          <a:fontRef idx="minor">
+            <a:schemeClr val="lt1"/>
+          </a:fontRef>
+        </p:style>
+        <p:txBody>
+          <a:bodyPr rtlCol="0" anchor="ctr"/>
+          <a:lstStyle/>
+          <a:p>
+            <a:pPr algn="ctr"/>
+            <a:endParaRPr lang="fr-FR"/>
+          </a:p>
+        </p:txBody>
+      </p:sp>
+      <p:sp>
+        <p:nvSpPr>
+          <p:cNvPr id="8" name="Forme libre : forme 7">
+            <a:extLst>
+              <a:ext uri="{FF2B5EF4-FFF2-40B4-BE49-F238E27FC236}">
+                <a16:creationId xmlns:a16="http://schemas.microsoft.com/office/drawing/2014/main" id="{ECC6B823-349B-44E3-9784-B11CDCC243A0}"/>
+              </a:ext>
+            </a:extLst>
+          </p:cNvPr>
+          <p:cNvSpPr/>
+          <p:nvPr/>
+        </p:nvSpPr>
+        <p:spPr>
+          <a:xfrm>
+            <a:off x="-92597" y="-150471"/>
+            <a:ext cx="2986268" cy="7118430"/>
+          </a:xfrm>
+          <a:custGeom>
+            <a:avLst/>
+            <a:gdLst>
+              <a:gd name="connsiteX0" fmla="*/ 23149 w 2986268"/>
+              <a:gd name="connsiteY0" fmla="*/ 0 h 7118430"/>
+              <a:gd name="connsiteX1" fmla="*/ 266217 w 2986268"/>
+              <a:gd name="connsiteY1" fmla="*/ 0 h 7118430"/>
+              <a:gd name="connsiteX2" fmla="*/ 810227 w 2986268"/>
+              <a:gd name="connsiteY2" fmla="*/ 3634451 h 7118430"/>
+              <a:gd name="connsiteX3" fmla="*/ 2986268 w 2986268"/>
+              <a:gd name="connsiteY3" fmla="*/ 7118430 h 7118430"/>
+              <a:gd name="connsiteX4" fmla="*/ 0 w 2986268"/>
+              <a:gd name="connsiteY4" fmla="*/ 7072132 h 7118430"/>
+              <a:gd name="connsiteX5" fmla="*/ 23149 w 2986268"/>
+              <a:gd name="connsiteY5" fmla="*/ 57874 h 7118430"/>
+              <a:gd name="connsiteX6" fmla="*/ 23149 w 2986268"/>
+              <a:gd name="connsiteY6" fmla="*/ 0 h 7118430"/>
+            </a:gdLst>
+            <a:ahLst/>
+            <a:cxnLst>
+              <a:cxn ang="0">
+                <a:pos x="connsiteX0" y="connsiteY0"/>
+              </a:cxn>
+              <a:cxn ang="0">
+                <a:pos x="connsiteX1" y="connsiteY1"/>
+              </a:cxn>
+              <a:cxn ang="0">
+                <a:pos x="connsiteX2" y="connsiteY2"/>
+              </a:cxn>
+              <a:cxn ang="0">
+                <a:pos x="connsiteX3" y="connsiteY3"/>
+              </a:cxn>
+              <a:cxn ang="0">
+                <a:pos x="connsiteX4" y="connsiteY4"/>
+              </a:cxn>
+              <a:cxn ang="0">
+                <a:pos x="connsiteX5" y="connsiteY5"/>
+              </a:cxn>
+              <a:cxn ang="0">
+                <a:pos x="connsiteX6" y="connsiteY6"/>
+              </a:cxn>
+            </a:cxnLst>
+            <a:rect l="l" t="t" r="r" b="b"/>
+            <a:pathLst>
+              <a:path w="2986268" h="7118430">
+                <a:moveTo>
+                  <a:pt x="23149" y="0"/>
+                </a:moveTo>
+                <a:lnTo>
+                  <a:pt x="266217" y="0"/>
+                </a:lnTo>
+                <a:lnTo>
+                  <a:pt x="810227" y="3634451"/>
+                </a:lnTo>
+                <a:lnTo>
+                  <a:pt x="2986268" y="7118430"/>
+                </a:lnTo>
+                <a:lnTo>
+                  <a:pt x="0" y="7072132"/>
+                </a:lnTo>
+                <a:cubicBezTo>
+                  <a:pt x="7716" y="4734046"/>
+                  <a:pt x="15433" y="2395960"/>
+                  <a:pt x="23149" y="57874"/>
+                </a:cubicBezTo>
+                <a:lnTo>
+                  <a:pt x="23149" y="0"/>
+                </a:lnTo>
+                <a:close/>
+              </a:path>
+            </a:pathLst>
+          </a:custGeom>
+          <a:solidFill>
+            <a:srgbClr val="FF5600">
+              <a:alpha val="60000"/>
+            </a:srgbClr>
+          </a:solidFill>
+          <a:ln>
+            <a:noFill/>
+          </a:ln>
+        </p:spPr>
+        <p:style>
+          <a:lnRef idx="2">
+            <a:schemeClr val="accent1">
+              <a:shade val="50000"/>
+            </a:schemeClr>
+          </a:lnRef>
+          <a:fillRef idx="1">
+            <a:schemeClr val="accent1"/>
+          </a:fillRef>
+          <a:effectRef idx="0">
+            <a:schemeClr val="accent1"/>
+          </a:effectRef>
+          <a:fontRef idx="minor">
+            <a:schemeClr val="lt1"/>
+          </a:fontRef>
+        </p:style>
+        <p:txBody>
+          <a:bodyPr rtlCol="0" anchor="ctr"/>
+          <a:lstStyle/>
+          <a:p>
+            <a:pPr algn="ctr"/>
+            <a:endParaRPr lang="fr-FR"/>
+          </a:p>
+        </p:txBody>
+      </p:sp>
+      <p:sp>
+        <p:nvSpPr>
+          <p:cNvPr id="9" name="Forme libre : forme 8">
+            <a:extLst>
+              <a:ext uri="{FF2B5EF4-FFF2-40B4-BE49-F238E27FC236}">
+                <a16:creationId xmlns:a16="http://schemas.microsoft.com/office/drawing/2014/main" id="{2B00372C-3F5B-4F83-9717-E64814CAFECC}"/>
+              </a:ext>
+            </a:extLst>
+          </p:cNvPr>
+          <p:cNvSpPr/>
+          <p:nvPr/>
+        </p:nvSpPr>
+        <p:spPr>
+          <a:xfrm>
+            <a:off x="-105198" y="-57873"/>
+            <a:ext cx="2292813" cy="7025832"/>
+          </a:xfrm>
+          <a:custGeom>
+            <a:avLst/>
+            <a:gdLst>
+              <a:gd name="connsiteX0" fmla="*/ 1026 w 2292813"/>
+              <a:gd name="connsiteY0" fmla="*/ 11574 h 7025832"/>
+              <a:gd name="connsiteX1" fmla="*/ 730231 w 2292813"/>
+              <a:gd name="connsiteY1" fmla="*/ 11574 h 7025832"/>
+              <a:gd name="connsiteX2" fmla="*/ 915426 w 2292813"/>
+              <a:gd name="connsiteY2" fmla="*/ 0 h 7025832"/>
+              <a:gd name="connsiteX3" fmla="*/ 996449 w 2292813"/>
+              <a:gd name="connsiteY3" fmla="*/ 4444678 h 7025832"/>
+              <a:gd name="connsiteX4" fmla="*/ 2292813 w 2292813"/>
+              <a:gd name="connsiteY4" fmla="*/ 7025832 h 7025832"/>
+              <a:gd name="connsiteX5" fmla="*/ 12601 w 2292813"/>
+              <a:gd name="connsiteY5" fmla="*/ 6967959 h 7025832"/>
+              <a:gd name="connsiteX6" fmla="*/ 1026 w 2292813"/>
+              <a:gd name="connsiteY6" fmla="*/ 11574 h 7025832"/>
+            </a:gdLst>
+            <a:ahLst/>
+            <a:cxnLst>
+              <a:cxn ang="0">
+                <a:pos x="connsiteX0" y="connsiteY0"/>
+              </a:cxn>
+              <a:cxn ang="0">
+                <a:pos x="connsiteX1" y="connsiteY1"/>
+              </a:cxn>
+              <a:cxn ang="0">
+                <a:pos x="connsiteX2" y="connsiteY2"/>
+              </a:cxn>
+              <a:cxn ang="0">
+                <a:pos x="connsiteX3" y="connsiteY3"/>
+              </a:cxn>
+              <a:cxn ang="0">
+                <a:pos x="connsiteX4" y="connsiteY4"/>
+              </a:cxn>
+              <a:cxn ang="0">
+                <a:pos x="connsiteX5" y="connsiteY5"/>
+              </a:cxn>
+              <a:cxn ang="0">
+                <a:pos x="connsiteX6" y="connsiteY6"/>
+              </a:cxn>
+            </a:cxnLst>
+            <a:rect l="l" t="t" r="r" b="b"/>
+            <a:pathLst>
+              <a:path w="2292813" h="7025832">
+                <a:moveTo>
+                  <a:pt x="1026" y="11574"/>
+                </a:moveTo>
+                <a:lnTo>
+                  <a:pt x="730231" y="11574"/>
+                </a:lnTo>
+                <a:lnTo>
+                  <a:pt x="915426" y="0"/>
+                </a:lnTo>
+                <a:lnTo>
+                  <a:pt x="996449" y="4444678"/>
+                </a:lnTo>
+                <a:lnTo>
+                  <a:pt x="2292813" y="7025832"/>
+                </a:lnTo>
+                <a:lnTo>
+                  <a:pt x="12601" y="6967959"/>
+                </a:lnTo>
+                <a:cubicBezTo>
+                  <a:pt x="4884" y="4637589"/>
+                  <a:pt x="-2832" y="2307220"/>
+                  <a:pt x="1026" y="11574"/>
+                </a:cubicBezTo>
+                <a:close/>
+              </a:path>
+            </a:pathLst>
+          </a:custGeom>
+          <a:solidFill>
+            <a:srgbClr val="FF5600">
+              <a:alpha val="60000"/>
+            </a:srgbClr>
+          </a:solidFill>
+          <a:ln>
+            <a:noFill/>
+          </a:ln>
+        </p:spPr>
+        <p:style>
+          <a:lnRef idx="2">
+            <a:schemeClr val="accent1">
+              <a:shade val="50000"/>
+            </a:schemeClr>
+          </a:lnRef>
+          <a:fillRef idx="1">
+            <a:schemeClr val="accent1"/>
+          </a:fillRef>
+          <a:effectRef idx="0">
+            <a:schemeClr val="accent1"/>
+          </a:effectRef>
+          <a:fontRef idx="minor">
+            <a:schemeClr val="lt1"/>
+          </a:fontRef>
+        </p:style>
+        <p:txBody>
+          <a:bodyPr rtlCol="0" anchor="ctr"/>
+          <a:lstStyle/>
+          <a:p>
+            <a:pPr algn="ctr"/>
+            <a:endParaRPr lang="fr-FR"/>
+          </a:p>
+        </p:txBody>
+      </p:sp>
+      <p:pic>
+        <p:nvPicPr>
+          <p:cNvPr id="13" name="Image 12">
+            <a:extLst>
+              <a:ext uri="{FF2B5EF4-FFF2-40B4-BE49-F238E27FC236}">
+                <a16:creationId xmlns:a16="http://schemas.microsoft.com/office/drawing/2014/main" id="{3D11499F-9576-4549-B722-236EA76804EA}"/>
+              </a:ext>
+            </a:extLst>
+          </p:cNvPr>
+          <p:cNvPicPr>
+            <a:picLocks noChangeAspect="1"/>
+          </p:cNvPicPr>
+          <p:nvPr/>
+        </p:nvPicPr>
+        <p:blipFill>
+          <a:blip r:embed="rId2">
+            <a:extLst>
+              <a:ext uri="{28A0092B-C50C-407E-A947-70E740481C1C}">
+                <a14:useLocalDpi xmlns:a14="http://schemas.microsoft.com/office/drawing/2010/main" val="0"/>
+              </a:ext>
+            </a:extLst>
+          </a:blip>
+          <a:stretch>
+            <a:fillRect/>
+          </a:stretch>
+        </p:blipFill>
+        <p:spPr>
+          <a:xfrm>
+            <a:off x="-109959" y="4941425"/>
+            <a:ext cx="1628172" cy="1628172"/>
+          </a:xfrm>
+          <a:prstGeom prst="rect">
+            <a:avLst/>
+          </a:prstGeom>
+        </p:spPr>
+      </p:pic>
+      <p:sp>
+        <p:nvSpPr>
+          <p:cNvPr id="2" name="ZoneTexte 1">
+            <a:extLst>
+              <a:ext uri="{FF2B5EF4-FFF2-40B4-BE49-F238E27FC236}">
+                <a16:creationId xmlns:a16="http://schemas.microsoft.com/office/drawing/2014/main" id="{FF343CEB-D2E3-4F33-A8FE-62A40B642D3B}"/>
               </a:ext>
             </a:extLst>
           </p:cNvPr>
@@ -7676,8 +8956,8 @@
         </p:nvSpPr>
         <p:spPr>
           <a:xfrm>
-            <a:off x="2893671" y="2070048"/>
-            <a:ext cx="8325293" cy="1384995"/>
+            <a:off x="-109959" y="207380"/>
+            <a:ext cx="12301958" cy="1015663"/>
           </a:xfrm>
           <a:prstGeom prst="rect">
             <a:avLst/>
@@ -7690,29 +8970,10 @@
           </a:bodyPr>
           <a:lstStyle/>
           <a:p>
+            <a:pPr algn="ctr"/>
             <a:r>
-              <a:rPr lang="fr-FR" sz="2800" dirty="0"/>
-              <a:t>sitemap.xml</a:t>
-            </a:r>
-          </a:p>
-          <a:p>
-            <a:r>
-              <a:rPr lang="fr-FR" sz="2800" dirty="0"/>
-              <a:t>robot.txt</a:t>
-            </a:r>
-          </a:p>
-          <a:p>
-            <a:r>
-              <a:rPr lang="fr-FR" sz="2800" dirty="0"/>
-              <a:t>balise </a:t>
-            </a:r>
-            <a:r>
-              <a:rPr lang="fr-FR" sz="2800" dirty="0" err="1"/>
-              <a:t>meta</a:t>
-            </a:r>
-            <a:r>
-              <a:rPr lang="fr-FR" sz="2800" dirty="0"/>
-              <a:t> description</a:t>
+              <a:rPr lang="fr-FR" sz="6000" b="1" spc="600" dirty="0"/>
+              <a:t>Prototype</a:t>
             </a:r>
           </a:p>
         </p:txBody>
@@ -7720,7 +8981,470 @@
     </p:spTree>
     <p:extLst>
       <p:ext uri="{BB962C8B-B14F-4D97-AF65-F5344CB8AC3E}">
-        <p14:creationId xmlns:p14="http://schemas.microsoft.com/office/powerpoint/2010/main" val="4251030148"/>
+        <p14:creationId xmlns:p14="http://schemas.microsoft.com/office/powerpoint/2010/main" val="1723833594"/>
+      </p:ext>
+    </p:extLst>
+  </p:cSld>
+  <p:clrMapOvr>
+    <a:masterClrMapping/>
+  </p:clrMapOvr>
+</p:sld>
+</file>
+
+<file path=ppt/slides/slide19.xml><?xml version="1.0" encoding="utf-8"?>
+<p:sld xmlns:a="http://schemas.openxmlformats.org/drawingml/2006/main" xmlns:r="http://schemas.openxmlformats.org/officeDocument/2006/relationships" xmlns:p="http://schemas.openxmlformats.org/presentationml/2006/main">
+  <p:cSld>
+    <p:spTree>
+      <p:nvGrpSpPr>
+        <p:cNvPr id="1" name=""/>
+        <p:cNvGrpSpPr/>
+        <p:nvPr/>
+      </p:nvGrpSpPr>
+      <p:grpSpPr>
+        <a:xfrm>
+          <a:off x="0" y="0"/>
+          <a:ext cx="0" cy="0"/>
+          <a:chOff x="0" y="0"/>
+          <a:chExt cx="0" cy="0"/>
+        </a:xfrm>
+      </p:grpSpPr>
+      <p:sp>
+        <p:nvSpPr>
+          <p:cNvPr id="6" name="Forme libre : forme 5">
+            <a:extLst>
+              <a:ext uri="{FF2B5EF4-FFF2-40B4-BE49-F238E27FC236}">
+                <a16:creationId xmlns:a16="http://schemas.microsoft.com/office/drawing/2014/main" id="{241A3761-269D-42AC-9090-FF44C3F3F66B}"/>
+              </a:ext>
+            </a:extLst>
+          </p:cNvPr>
+          <p:cNvSpPr/>
+          <p:nvPr/>
+        </p:nvSpPr>
+        <p:spPr>
+          <a:xfrm>
+            <a:off x="-46299" y="-57873"/>
+            <a:ext cx="2650603" cy="6944810"/>
+          </a:xfrm>
+          <a:custGeom>
+            <a:avLst/>
+            <a:gdLst>
+              <a:gd name="connsiteX0" fmla="*/ 0 w 2650603"/>
+              <a:gd name="connsiteY0" fmla="*/ 11574 h 6944810"/>
+              <a:gd name="connsiteX1" fmla="*/ 11575 w 2650603"/>
+              <a:gd name="connsiteY1" fmla="*/ 6944810 h 6944810"/>
+              <a:gd name="connsiteX2" fmla="*/ 2650603 w 2650603"/>
+              <a:gd name="connsiteY2" fmla="*/ 6944810 h 6944810"/>
+              <a:gd name="connsiteX3" fmla="*/ 1169043 w 2650603"/>
+              <a:gd name="connsiteY3" fmla="*/ 2951544 h 6944810"/>
+              <a:gd name="connsiteX4" fmla="*/ 532436 w 2650603"/>
+              <a:gd name="connsiteY4" fmla="*/ 0 h 6944810"/>
+              <a:gd name="connsiteX5" fmla="*/ 0 w 2650603"/>
+              <a:gd name="connsiteY5" fmla="*/ 11574 h 6944810"/>
+            </a:gdLst>
+            <a:ahLst/>
+            <a:cxnLst>
+              <a:cxn ang="0">
+                <a:pos x="connsiteX0" y="connsiteY0"/>
+              </a:cxn>
+              <a:cxn ang="0">
+                <a:pos x="connsiteX1" y="connsiteY1"/>
+              </a:cxn>
+              <a:cxn ang="0">
+                <a:pos x="connsiteX2" y="connsiteY2"/>
+              </a:cxn>
+              <a:cxn ang="0">
+                <a:pos x="connsiteX3" y="connsiteY3"/>
+              </a:cxn>
+              <a:cxn ang="0">
+                <a:pos x="connsiteX4" y="connsiteY4"/>
+              </a:cxn>
+              <a:cxn ang="0">
+                <a:pos x="connsiteX5" y="connsiteY5"/>
+              </a:cxn>
+            </a:cxnLst>
+            <a:rect l="l" t="t" r="r" b="b"/>
+            <a:pathLst>
+              <a:path w="2650603" h="6944810">
+                <a:moveTo>
+                  <a:pt x="0" y="11574"/>
+                </a:moveTo>
+                <a:cubicBezTo>
+                  <a:pt x="3858" y="2322653"/>
+                  <a:pt x="7717" y="4633731"/>
+                  <a:pt x="11575" y="6944810"/>
+                </a:cubicBezTo>
+                <a:lnTo>
+                  <a:pt x="2650603" y="6944810"/>
+                </a:lnTo>
+                <a:lnTo>
+                  <a:pt x="1169043" y="2951544"/>
+                </a:lnTo>
+                <a:lnTo>
+                  <a:pt x="532436" y="0"/>
+                </a:lnTo>
+                <a:lnTo>
+                  <a:pt x="0" y="11574"/>
+                </a:lnTo>
+                <a:close/>
+              </a:path>
+            </a:pathLst>
+          </a:custGeom>
+          <a:solidFill>
+            <a:srgbClr val="FF5600">
+              <a:alpha val="60000"/>
+            </a:srgbClr>
+          </a:solidFill>
+          <a:ln>
+            <a:noFill/>
+          </a:ln>
+        </p:spPr>
+        <p:style>
+          <a:lnRef idx="2">
+            <a:schemeClr val="accent1">
+              <a:shade val="50000"/>
+            </a:schemeClr>
+          </a:lnRef>
+          <a:fillRef idx="1">
+            <a:schemeClr val="accent1"/>
+          </a:fillRef>
+          <a:effectRef idx="0">
+            <a:schemeClr val="accent1"/>
+          </a:effectRef>
+          <a:fontRef idx="minor">
+            <a:schemeClr val="lt1"/>
+          </a:fontRef>
+        </p:style>
+        <p:txBody>
+          <a:bodyPr rtlCol="0" anchor="ctr"/>
+          <a:lstStyle/>
+          <a:p>
+            <a:pPr algn="ctr"/>
+            <a:endParaRPr lang="fr-FR"/>
+          </a:p>
+        </p:txBody>
+      </p:sp>
+      <p:sp>
+        <p:nvSpPr>
+          <p:cNvPr id="8" name="Forme libre : forme 7">
+            <a:extLst>
+              <a:ext uri="{FF2B5EF4-FFF2-40B4-BE49-F238E27FC236}">
+                <a16:creationId xmlns:a16="http://schemas.microsoft.com/office/drawing/2014/main" id="{ECC6B823-349B-44E3-9784-B11CDCC243A0}"/>
+              </a:ext>
+            </a:extLst>
+          </p:cNvPr>
+          <p:cNvSpPr/>
+          <p:nvPr/>
+        </p:nvSpPr>
+        <p:spPr>
+          <a:xfrm>
+            <a:off x="-92597" y="-150471"/>
+            <a:ext cx="2986268" cy="7118430"/>
+          </a:xfrm>
+          <a:custGeom>
+            <a:avLst/>
+            <a:gdLst>
+              <a:gd name="connsiteX0" fmla="*/ 23149 w 2986268"/>
+              <a:gd name="connsiteY0" fmla="*/ 0 h 7118430"/>
+              <a:gd name="connsiteX1" fmla="*/ 266217 w 2986268"/>
+              <a:gd name="connsiteY1" fmla="*/ 0 h 7118430"/>
+              <a:gd name="connsiteX2" fmla="*/ 810227 w 2986268"/>
+              <a:gd name="connsiteY2" fmla="*/ 3634451 h 7118430"/>
+              <a:gd name="connsiteX3" fmla="*/ 2986268 w 2986268"/>
+              <a:gd name="connsiteY3" fmla="*/ 7118430 h 7118430"/>
+              <a:gd name="connsiteX4" fmla="*/ 0 w 2986268"/>
+              <a:gd name="connsiteY4" fmla="*/ 7072132 h 7118430"/>
+              <a:gd name="connsiteX5" fmla="*/ 23149 w 2986268"/>
+              <a:gd name="connsiteY5" fmla="*/ 57874 h 7118430"/>
+              <a:gd name="connsiteX6" fmla="*/ 23149 w 2986268"/>
+              <a:gd name="connsiteY6" fmla="*/ 0 h 7118430"/>
+            </a:gdLst>
+            <a:ahLst/>
+            <a:cxnLst>
+              <a:cxn ang="0">
+                <a:pos x="connsiteX0" y="connsiteY0"/>
+              </a:cxn>
+              <a:cxn ang="0">
+                <a:pos x="connsiteX1" y="connsiteY1"/>
+              </a:cxn>
+              <a:cxn ang="0">
+                <a:pos x="connsiteX2" y="connsiteY2"/>
+              </a:cxn>
+              <a:cxn ang="0">
+                <a:pos x="connsiteX3" y="connsiteY3"/>
+              </a:cxn>
+              <a:cxn ang="0">
+                <a:pos x="connsiteX4" y="connsiteY4"/>
+              </a:cxn>
+              <a:cxn ang="0">
+                <a:pos x="connsiteX5" y="connsiteY5"/>
+              </a:cxn>
+              <a:cxn ang="0">
+                <a:pos x="connsiteX6" y="connsiteY6"/>
+              </a:cxn>
+            </a:cxnLst>
+            <a:rect l="l" t="t" r="r" b="b"/>
+            <a:pathLst>
+              <a:path w="2986268" h="7118430">
+                <a:moveTo>
+                  <a:pt x="23149" y="0"/>
+                </a:moveTo>
+                <a:lnTo>
+                  <a:pt x="266217" y="0"/>
+                </a:lnTo>
+                <a:lnTo>
+                  <a:pt x="810227" y="3634451"/>
+                </a:lnTo>
+                <a:lnTo>
+                  <a:pt x="2986268" y="7118430"/>
+                </a:lnTo>
+                <a:lnTo>
+                  <a:pt x="0" y="7072132"/>
+                </a:lnTo>
+                <a:cubicBezTo>
+                  <a:pt x="7716" y="4734046"/>
+                  <a:pt x="15433" y="2395960"/>
+                  <a:pt x="23149" y="57874"/>
+                </a:cubicBezTo>
+                <a:lnTo>
+                  <a:pt x="23149" y="0"/>
+                </a:lnTo>
+                <a:close/>
+              </a:path>
+            </a:pathLst>
+          </a:custGeom>
+          <a:solidFill>
+            <a:srgbClr val="FF5600">
+              <a:alpha val="60000"/>
+            </a:srgbClr>
+          </a:solidFill>
+          <a:ln>
+            <a:noFill/>
+          </a:ln>
+        </p:spPr>
+        <p:style>
+          <a:lnRef idx="2">
+            <a:schemeClr val="accent1">
+              <a:shade val="50000"/>
+            </a:schemeClr>
+          </a:lnRef>
+          <a:fillRef idx="1">
+            <a:schemeClr val="accent1"/>
+          </a:fillRef>
+          <a:effectRef idx="0">
+            <a:schemeClr val="accent1"/>
+          </a:effectRef>
+          <a:fontRef idx="minor">
+            <a:schemeClr val="lt1"/>
+          </a:fontRef>
+        </p:style>
+        <p:txBody>
+          <a:bodyPr rtlCol="0" anchor="ctr"/>
+          <a:lstStyle/>
+          <a:p>
+            <a:pPr algn="ctr"/>
+            <a:endParaRPr lang="fr-FR"/>
+          </a:p>
+        </p:txBody>
+      </p:sp>
+      <p:sp>
+        <p:nvSpPr>
+          <p:cNvPr id="9" name="Forme libre : forme 8">
+            <a:extLst>
+              <a:ext uri="{FF2B5EF4-FFF2-40B4-BE49-F238E27FC236}">
+                <a16:creationId xmlns:a16="http://schemas.microsoft.com/office/drawing/2014/main" id="{2B00372C-3F5B-4F83-9717-E64814CAFECC}"/>
+              </a:ext>
+            </a:extLst>
+          </p:cNvPr>
+          <p:cNvSpPr/>
+          <p:nvPr/>
+        </p:nvSpPr>
+        <p:spPr>
+          <a:xfrm>
+            <a:off x="-105198" y="-57873"/>
+            <a:ext cx="2292813" cy="7025832"/>
+          </a:xfrm>
+          <a:custGeom>
+            <a:avLst/>
+            <a:gdLst>
+              <a:gd name="connsiteX0" fmla="*/ 1026 w 2292813"/>
+              <a:gd name="connsiteY0" fmla="*/ 11574 h 7025832"/>
+              <a:gd name="connsiteX1" fmla="*/ 730231 w 2292813"/>
+              <a:gd name="connsiteY1" fmla="*/ 11574 h 7025832"/>
+              <a:gd name="connsiteX2" fmla="*/ 915426 w 2292813"/>
+              <a:gd name="connsiteY2" fmla="*/ 0 h 7025832"/>
+              <a:gd name="connsiteX3" fmla="*/ 996449 w 2292813"/>
+              <a:gd name="connsiteY3" fmla="*/ 4444678 h 7025832"/>
+              <a:gd name="connsiteX4" fmla="*/ 2292813 w 2292813"/>
+              <a:gd name="connsiteY4" fmla="*/ 7025832 h 7025832"/>
+              <a:gd name="connsiteX5" fmla="*/ 12601 w 2292813"/>
+              <a:gd name="connsiteY5" fmla="*/ 6967959 h 7025832"/>
+              <a:gd name="connsiteX6" fmla="*/ 1026 w 2292813"/>
+              <a:gd name="connsiteY6" fmla="*/ 11574 h 7025832"/>
+            </a:gdLst>
+            <a:ahLst/>
+            <a:cxnLst>
+              <a:cxn ang="0">
+                <a:pos x="connsiteX0" y="connsiteY0"/>
+              </a:cxn>
+              <a:cxn ang="0">
+                <a:pos x="connsiteX1" y="connsiteY1"/>
+              </a:cxn>
+              <a:cxn ang="0">
+                <a:pos x="connsiteX2" y="connsiteY2"/>
+              </a:cxn>
+              <a:cxn ang="0">
+                <a:pos x="connsiteX3" y="connsiteY3"/>
+              </a:cxn>
+              <a:cxn ang="0">
+                <a:pos x="connsiteX4" y="connsiteY4"/>
+              </a:cxn>
+              <a:cxn ang="0">
+                <a:pos x="connsiteX5" y="connsiteY5"/>
+              </a:cxn>
+              <a:cxn ang="0">
+                <a:pos x="connsiteX6" y="connsiteY6"/>
+              </a:cxn>
+            </a:cxnLst>
+            <a:rect l="l" t="t" r="r" b="b"/>
+            <a:pathLst>
+              <a:path w="2292813" h="7025832">
+                <a:moveTo>
+                  <a:pt x="1026" y="11574"/>
+                </a:moveTo>
+                <a:lnTo>
+                  <a:pt x="730231" y="11574"/>
+                </a:lnTo>
+                <a:lnTo>
+                  <a:pt x="915426" y="0"/>
+                </a:lnTo>
+                <a:lnTo>
+                  <a:pt x="996449" y="4444678"/>
+                </a:lnTo>
+                <a:lnTo>
+                  <a:pt x="2292813" y="7025832"/>
+                </a:lnTo>
+                <a:lnTo>
+                  <a:pt x="12601" y="6967959"/>
+                </a:lnTo>
+                <a:cubicBezTo>
+                  <a:pt x="4884" y="4637589"/>
+                  <a:pt x="-2832" y="2307220"/>
+                  <a:pt x="1026" y="11574"/>
+                </a:cubicBezTo>
+                <a:close/>
+              </a:path>
+            </a:pathLst>
+          </a:custGeom>
+          <a:solidFill>
+            <a:srgbClr val="FF5600">
+              <a:alpha val="60000"/>
+            </a:srgbClr>
+          </a:solidFill>
+          <a:ln>
+            <a:noFill/>
+          </a:ln>
+        </p:spPr>
+        <p:style>
+          <a:lnRef idx="2">
+            <a:schemeClr val="accent1">
+              <a:shade val="50000"/>
+            </a:schemeClr>
+          </a:lnRef>
+          <a:fillRef idx="1">
+            <a:schemeClr val="accent1"/>
+          </a:fillRef>
+          <a:effectRef idx="0">
+            <a:schemeClr val="accent1"/>
+          </a:effectRef>
+          <a:fontRef idx="minor">
+            <a:schemeClr val="lt1"/>
+          </a:fontRef>
+        </p:style>
+        <p:txBody>
+          <a:bodyPr rtlCol="0" anchor="ctr"/>
+          <a:lstStyle/>
+          <a:p>
+            <a:pPr algn="ctr"/>
+            <a:endParaRPr lang="fr-FR"/>
+          </a:p>
+        </p:txBody>
+      </p:sp>
+      <p:pic>
+        <p:nvPicPr>
+          <p:cNvPr id="13" name="Image 12">
+            <a:extLst>
+              <a:ext uri="{FF2B5EF4-FFF2-40B4-BE49-F238E27FC236}">
+                <a16:creationId xmlns:a16="http://schemas.microsoft.com/office/drawing/2014/main" id="{3D11499F-9576-4549-B722-236EA76804EA}"/>
+              </a:ext>
+            </a:extLst>
+          </p:cNvPr>
+          <p:cNvPicPr>
+            <a:picLocks noChangeAspect="1"/>
+          </p:cNvPicPr>
+          <p:nvPr/>
+        </p:nvPicPr>
+        <p:blipFill>
+          <a:blip r:embed="rId2">
+            <a:extLst>
+              <a:ext uri="{28A0092B-C50C-407E-A947-70E740481C1C}">
+                <a14:useLocalDpi xmlns:a14="http://schemas.microsoft.com/office/drawing/2010/main" val="0"/>
+              </a:ext>
+            </a:extLst>
+          </a:blip>
+          <a:stretch>
+            <a:fillRect/>
+          </a:stretch>
+        </p:blipFill>
+        <p:spPr>
+          <a:xfrm>
+            <a:off x="-109959" y="4941425"/>
+            <a:ext cx="1628172" cy="1628172"/>
+          </a:xfrm>
+          <a:prstGeom prst="rect">
+            <a:avLst/>
+          </a:prstGeom>
+        </p:spPr>
+      </p:pic>
+      <p:sp>
+        <p:nvSpPr>
+          <p:cNvPr id="2" name="ZoneTexte 1">
+            <a:extLst>
+              <a:ext uri="{FF2B5EF4-FFF2-40B4-BE49-F238E27FC236}">
+                <a16:creationId xmlns:a16="http://schemas.microsoft.com/office/drawing/2014/main" id="{FF343CEB-D2E3-4F33-A8FE-62A40B642D3B}"/>
+              </a:ext>
+            </a:extLst>
+          </p:cNvPr>
+          <p:cNvSpPr txBox="1"/>
+          <p:nvPr/>
+        </p:nvSpPr>
+        <p:spPr>
+          <a:xfrm>
+            <a:off x="-109959" y="207380"/>
+            <a:ext cx="12301958" cy="1015663"/>
+          </a:xfrm>
+          <a:prstGeom prst="rect">
+            <a:avLst/>
+          </a:prstGeom>
+          <a:noFill/>
+        </p:spPr>
+        <p:txBody>
+          <a:bodyPr wrap="square" rtlCol="0">
+            <a:spAutoFit/>
+          </a:bodyPr>
+          <a:lstStyle/>
+          <a:p>
+            <a:pPr algn="ctr"/>
+            <a:r>
+              <a:rPr lang="fr-FR" sz="6000" b="1" spc="600" dirty="0"/>
+              <a:t>Normes et législations</a:t>
+            </a:r>
+          </a:p>
+        </p:txBody>
+      </p:sp>
+    </p:spTree>
+    <p:extLst>
+      <p:ext uri="{BB962C8B-B14F-4D97-AF65-F5344CB8AC3E}">
+        <p14:creationId xmlns:p14="http://schemas.microsoft.com/office/powerpoint/2010/main" val="4060428811"/>
       </p:ext>
     </p:extLst>
   </p:cSld>
@@ -8435,7 +10159,7 @@
 </p:sld>
 </file>
 
-<file path=ppt/slides/slide3.xml><?xml version="1.0" encoding="utf-8"?>
+<file path=ppt/slides/slide20.xml><?xml version="1.0" encoding="utf-8"?>
 <p:sld xmlns:a="http://schemas.openxmlformats.org/drawingml/2006/main" xmlns:r="http://schemas.openxmlformats.org/officeDocument/2006/relationships" xmlns:p="http://schemas.openxmlformats.org/presentationml/2006/main">
   <p:cSld>
     <p:spTree>
@@ -8849,12 +10573,48 @@
           </a:prstGeom>
         </p:spPr>
       </p:pic>
+      <p:sp>
+        <p:nvSpPr>
+          <p:cNvPr id="2" name="ZoneTexte 1">
+            <a:extLst>
+              <a:ext uri="{FF2B5EF4-FFF2-40B4-BE49-F238E27FC236}">
+                <a16:creationId xmlns:a16="http://schemas.microsoft.com/office/drawing/2014/main" id="{FF343CEB-D2E3-4F33-A8FE-62A40B642D3B}"/>
+              </a:ext>
+            </a:extLst>
+          </p:cNvPr>
+          <p:cNvSpPr txBox="1"/>
+          <p:nvPr/>
+        </p:nvSpPr>
+        <p:spPr>
+          <a:xfrm>
+            <a:off x="-109959" y="207380"/>
+            <a:ext cx="12301958" cy="1015663"/>
+          </a:xfrm>
+          <a:prstGeom prst="rect">
+            <a:avLst/>
+          </a:prstGeom>
+          <a:noFill/>
+        </p:spPr>
+        <p:txBody>
+          <a:bodyPr wrap="square" rtlCol="0">
+            <a:spAutoFit/>
+          </a:bodyPr>
+          <a:lstStyle/>
+          <a:p>
+            <a:pPr algn="ctr"/>
+            <a:r>
+              <a:rPr lang="fr-FR" sz="6000" b="1" spc="600" dirty="0"/>
+              <a:t>Technologies</a:t>
+            </a:r>
+          </a:p>
+        </p:txBody>
+      </p:sp>
       <p:pic>
         <p:nvPicPr>
           <p:cNvPr id="4" name="Image 3">
             <a:extLst>
               <a:ext uri="{FF2B5EF4-FFF2-40B4-BE49-F238E27FC236}">
-                <a16:creationId xmlns:a16="http://schemas.microsoft.com/office/drawing/2014/main" id="{E4D6D524-6760-48A3-BD47-90915DD5FF54}"/>
+                <a16:creationId xmlns:a16="http://schemas.microsoft.com/office/drawing/2014/main" id="{6F697742-2EDE-424E-8575-44620DBD2DCC}"/>
               </a:ext>
             </a:extLst>
           </p:cNvPr>
@@ -8877,8 +10637,1241 @@
         </p:blipFill>
         <p:spPr>
           <a:xfrm>
-            <a:off x="1713053" y="669255"/>
-            <a:ext cx="2650603" cy="2759745"/>
+            <a:off x="3251841" y="3943265"/>
+            <a:ext cx="3815167" cy="2331491"/>
+          </a:xfrm>
+          <a:prstGeom prst="rect">
+            <a:avLst/>
+          </a:prstGeom>
+        </p:spPr>
+      </p:pic>
+      <p:pic>
+        <p:nvPicPr>
+          <p:cNvPr id="7" name="Image 6">
+            <a:extLst>
+              <a:ext uri="{FF2B5EF4-FFF2-40B4-BE49-F238E27FC236}">
+                <a16:creationId xmlns:a16="http://schemas.microsoft.com/office/drawing/2014/main" id="{55BA3968-FA82-4236-889F-1FAACC376421}"/>
+              </a:ext>
+            </a:extLst>
+          </p:cNvPr>
+          <p:cNvPicPr>
+            <a:picLocks noChangeAspect="1"/>
+          </p:cNvPicPr>
+          <p:nvPr/>
+        </p:nvPicPr>
+        <p:blipFill>
+          <a:blip r:embed="rId4">
+            <a:extLst>
+              <a:ext uri="{28A0092B-C50C-407E-A947-70E740481C1C}">
+                <a14:useLocalDpi xmlns:a14="http://schemas.microsoft.com/office/drawing/2010/main" val="0"/>
+              </a:ext>
+            </a:extLst>
+          </a:blip>
+          <a:stretch>
+            <a:fillRect/>
+          </a:stretch>
+        </p:blipFill>
+        <p:spPr>
+          <a:xfrm>
+            <a:off x="7379998" y="4015947"/>
+            <a:ext cx="1549528" cy="2186126"/>
+          </a:xfrm>
+          <a:prstGeom prst="rect">
+            <a:avLst/>
+          </a:prstGeom>
+        </p:spPr>
+      </p:pic>
+      <p:pic>
+        <p:nvPicPr>
+          <p:cNvPr id="11" name="Image 10">
+            <a:extLst>
+              <a:ext uri="{FF2B5EF4-FFF2-40B4-BE49-F238E27FC236}">
+                <a16:creationId xmlns:a16="http://schemas.microsoft.com/office/drawing/2014/main" id="{B82DEBC0-332E-45A3-9415-1E91252F8EFE}"/>
+              </a:ext>
+            </a:extLst>
+          </p:cNvPr>
+          <p:cNvPicPr>
+            <a:picLocks noChangeAspect="1"/>
+          </p:cNvPicPr>
+          <p:nvPr/>
+        </p:nvPicPr>
+        <p:blipFill>
+          <a:blip r:embed="rId5">
+            <a:extLst>
+              <a:ext uri="{28A0092B-C50C-407E-A947-70E740481C1C}">
+                <a14:useLocalDpi xmlns:a14="http://schemas.microsoft.com/office/drawing/2010/main" val="0"/>
+              </a:ext>
+            </a:extLst>
+          </a:blip>
+          <a:stretch>
+            <a:fillRect/>
+          </a:stretch>
+        </p:blipFill>
+        <p:spPr>
+          <a:xfrm>
+            <a:off x="5159425" y="1772006"/>
+            <a:ext cx="1763190" cy="1763190"/>
+          </a:xfrm>
+          <a:prstGeom prst="rect">
+            <a:avLst/>
+          </a:prstGeom>
+        </p:spPr>
+      </p:pic>
+      <p:pic>
+        <p:nvPicPr>
+          <p:cNvPr id="14" name="Image 13">
+            <a:extLst>
+              <a:ext uri="{FF2B5EF4-FFF2-40B4-BE49-F238E27FC236}">
+                <a16:creationId xmlns:a16="http://schemas.microsoft.com/office/drawing/2014/main" id="{EB189462-56B9-4709-BA4D-0861EB8CA1BA}"/>
+              </a:ext>
+            </a:extLst>
+          </p:cNvPr>
+          <p:cNvPicPr>
+            <a:picLocks noChangeAspect="1"/>
+          </p:cNvPicPr>
+          <p:nvPr/>
+        </p:nvPicPr>
+        <p:blipFill>
+          <a:blip r:embed="rId6">
+            <a:extLst>
+              <a:ext uri="{28A0092B-C50C-407E-A947-70E740481C1C}">
+                <a14:useLocalDpi xmlns:a14="http://schemas.microsoft.com/office/drawing/2010/main" val="0"/>
+              </a:ext>
+            </a:extLst>
+          </a:blip>
+          <a:stretch>
+            <a:fillRect/>
+          </a:stretch>
+        </p:blipFill>
+        <p:spPr>
+          <a:xfrm>
+            <a:off x="3024533" y="1686755"/>
+            <a:ext cx="1936030" cy="1936030"/>
+          </a:xfrm>
+          <a:prstGeom prst="rect">
+            <a:avLst/>
+          </a:prstGeom>
+        </p:spPr>
+      </p:pic>
+      <p:pic>
+        <p:nvPicPr>
+          <p:cNvPr id="5" name="Image 4">
+            <a:extLst>
+              <a:ext uri="{FF2B5EF4-FFF2-40B4-BE49-F238E27FC236}">
+                <a16:creationId xmlns:a16="http://schemas.microsoft.com/office/drawing/2014/main" id="{569166A0-CC58-4D5C-BB99-4C889876C6AB}"/>
+              </a:ext>
+            </a:extLst>
+          </p:cNvPr>
+          <p:cNvPicPr>
+            <a:picLocks noChangeAspect="1"/>
+          </p:cNvPicPr>
+          <p:nvPr/>
+        </p:nvPicPr>
+        <p:blipFill>
+          <a:blip r:embed="rId7">
+            <a:extLst>
+              <a:ext uri="{28A0092B-C50C-407E-A947-70E740481C1C}">
+                <a14:useLocalDpi xmlns:a14="http://schemas.microsoft.com/office/drawing/2010/main" val="0"/>
+              </a:ext>
+            </a:extLst>
+          </a:blip>
+          <a:stretch>
+            <a:fillRect/>
+          </a:stretch>
+        </p:blipFill>
+        <p:spPr>
+          <a:xfrm>
+            <a:off x="7567032" y="1772005"/>
+            <a:ext cx="1175461" cy="1763191"/>
+          </a:xfrm>
+          <a:prstGeom prst="rect">
+            <a:avLst/>
+          </a:prstGeom>
+        </p:spPr>
+      </p:pic>
+    </p:spTree>
+    <p:extLst>
+      <p:ext uri="{BB962C8B-B14F-4D97-AF65-F5344CB8AC3E}">
+        <p14:creationId xmlns:p14="http://schemas.microsoft.com/office/powerpoint/2010/main" val="94616276"/>
+      </p:ext>
+    </p:extLst>
+  </p:cSld>
+  <p:clrMapOvr>
+    <a:masterClrMapping/>
+  </p:clrMapOvr>
+</p:sld>
+</file>
+
+<file path=ppt/slides/slide21.xml><?xml version="1.0" encoding="utf-8"?>
+<p:sld xmlns:a="http://schemas.openxmlformats.org/drawingml/2006/main" xmlns:r="http://schemas.openxmlformats.org/officeDocument/2006/relationships" xmlns:p="http://schemas.openxmlformats.org/presentationml/2006/main">
+  <p:cSld>
+    <p:spTree>
+      <p:nvGrpSpPr>
+        <p:cNvPr id="1" name=""/>
+        <p:cNvGrpSpPr/>
+        <p:nvPr/>
+      </p:nvGrpSpPr>
+      <p:grpSpPr>
+        <a:xfrm>
+          <a:off x="0" y="0"/>
+          <a:ext cx="0" cy="0"/>
+          <a:chOff x="0" y="0"/>
+          <a:chExt cx="0" cy="0"/>
+        </a:xfrm>
+      </p:grpSpPr>
+      <p:sp>
+        <p:nvSpPr>
+          <p:cNvPr id="6" name="Forme libre : forme 5">
+            <a:extLst>
+              <a:ext uri="{FF2B5EF4-FFF2-40B4-BE49-F238E27FC236}">
+                <a16:creationId xmlns:a16="http://schemas.microsoft.com/office/drawing/2014/main" id="{241A3761-269D-42AC-9090-FF44C3F3F66B}"/>
+              </a:ext>
+            </a:extLst>
+          </p:cNvPr>
+          <p:cNvSpPr/>
+          <p:nvPr/>
+        </p:nvSpPr>
+        <p:spPr>
+          <a:xfrm>
+            <a:off x="-46299" y="-57873"/>
+            <a:ext cx="2650603" cy="6944810"/>
+          </a:xfrm>
+          <a:custGeom>
+            <a:avLst/>
+            <a:gdLst>
+              <a:gd name="connsiteX0" fmla="*/ 0 w 2650603"/>
+              <a:gd name="connsiteY0" fmla="*/ 11574 h 6944810"/>
+              <a:gd name="connsiteX1" fmla="*/ 11575 w 2650603"/>
+              <a:gd name="connsiteY1" fmla="*/ 6944810 h 6944810"/>
+              <a:gd name="connsiteX2" fmla="*/ 2650603 w 2650603"/>
+              <a:gd name="connsiteY2" fmla="*/ 6944810 h 6944810"/>
+              <a:gd name="connsiteX3" fmla="*/ 1169043 w 2650603"/>
+              <a:gd name="connsiteY3" fmla="*/ 2951544 h 6944810"/>
+              <a:gd name="connsiteX4" fmla="*/ 532436 w 2650603"/>
+              <a:gd name="connsiteY4" fmla="*/ 0 h 6944810"/>
+              <a:gd name="connsiteX5" fmla="*/ 0 w 2650603"/>
+              <a:gd name="connsiteY5" fmla="*/ 11574 h 6944810"/>
+            </a:gdLst>
+            <a:ahLst/>
+            <a:cxnLst>
+              <a:cxn ang="0">
+                <a:pos x="connsiteX0" y="connsiteY0"/>
+              </a:cxn>
+              <a:cxn ang="0">
+                <a:pos x="connsiteX1" y="connsiteY1"/>
+              </a:cxn>
+              <a:cxn ang="0">
+                <a:pos x="connsiteX2" y="connsiteY2"/>
+              </a:cxn>
+              <a:cxn ang="0">
+                <a:pos x="connsiteX3" y="connsiteY3"/>
+              </a:cxn>
+              <a:cxn ang="0">
+                <a:pos x="connsiteX4" y="connsiteY4"/>
+              </a:cxn>
+              <a:cxn ang="0">
+                <a:pos x="connsiteX5" y="connsiteY5"/>
+              </a:cxn>
+            </a:cxnLst>
+            <a:rect l="l" t="t" r="r" b="b"/>
+            <a:pathLst>
+              <a:path w="2650603" h="6944810">
+                <a:moveTo>
+                  <a:pt x="0" y="11574"/>
+                </a:moveTo>
+                <a:cubicBezTo>
+                  <a:pt x="3858" y="2322653"/>
+                  <a:pt x="7717" y="4633731"/>
+                  <a:pt x="11575" y="6944810"/>
+                </a:cubicBezTo>
+                <a:lnTo>
+                  <a:pt x="2650603" y="6944810"/>
+                </a:lnTo>
+                <a:lnTo>
+                  <a:pt x="1169043" y="2951544"/>
+                </a:lnTo>
+                <a:lnTo>
+                  <a:pt x="532436" y="0"/>
+                </a:lnTo>
+                <a:lnTo>
+                  <a:pt x="0" y="11574"/>
+                </a:lnTo>
+                <a:close/>
+              </a:path>
+            </a:pathLst>
+          </a:custGeom>
+          <a:solidFill>
+            <a:srgbClr val="FF5600">
+              <a:alpha val="60000"/>
+            </a:srgbClr>
+          </a:solidFill>
+          <a:ln>
+            <a:noFill/>
+          </a:ln>
+        </p:spPr>
+        <p:style>
+          <a:lnRef idx="2">
+            <a:schemeClr val="accent1">
+              <a:shade val="50000"/>
+            </a:schemeClr>
+          </a:lnRef>
+          <a:fillRef idx="1">
+            <a:schemeClr val="accent1"/>
+          </a:fillRef>
+          <a:effectRef idx="0">
+            <a:schemeClr val="accent1"/>
+          </a:effectRef>
+          <a:fontRef idx="minor">
+            <a:schemeClr val="lt1"/>
+          </a:fontRef>
+        </p:style>
+        <p:txBody>
+          <a:bodyPr rtlCol="0" anchor="ctr"/>
+          <a:lstStyle/>
+          <a:p>
+            <a:pPr algn="ctr"/>
+            <a:endParaRPr lang="fr-FR"/>
+          </a:p>
+        </p:txBody>
+      </p:sp>
+      <p:sp>
+        <p:nvSpPr>
+          <p:cNvPr id="8" name="Forme libre : forme 7">
+            <a:extLst>
+              <a:ext uri="{FF2B5EF4-FFF2-40B4-BE49-F238E27FC236}">
+                <a16:creationId xmlns:a16="http://schemas.microsoft.com/office/drawing/2014/main" id="{ECC6B823-349B-44E3-9784-B11CDCC243A0}"/>
+              </a:ext>
+            </a:extLst>
+          </p:cNvPr>
+          <p:cNvSpPr/>
+          <p:nvPr/>
+        </p:nvSpPr>
+        <p:spPr>
+          <a:xfrm>
+            <a:off x="-92597" y="-150471"/>
+            <a:ext cx="2986268" cy="7118430"/>
+          </a:xfrm>
+          <a:custGeom>
+            <a:avLst/>
+            <a:gdLst>
+              <a:gd name="connsiteX0" fmla="*/ 23149 w 2986268"/>
+              <a:gd name="connsiteY0" fmla="*/ 0 h 7118430"/>
+              <a:gd name="connsiteX1" fmla="*/ 266217 w 2986268"/>
+              <a:gd name="connsiteY1" fmla="*/ 0 h 7118430"/>
+              <a:gd name="connsiteX2" fmla="*/ 810227 w 2986268"/>
+              <a:gd name="connsiteY2" fmla="*/ 3634451 h 7118430"/>
+              <a:gd name="connsiteX3" fmla="*/ 2986268 w 2986268"/>
+              <a:gd name="connsiteY3" fmla="*/ 7118430 h 7118430"/>
+              <a:gd name="connsiteX4" fmla="*/ 0 w 2986268"/>
+              <a:gd name="connsiteY4" fmla="*/ 7072132 h 7118430"/>
+              <a:gd name="connsiteX5" fmla="*/ 23149 w 2986268"/>
+              <a:gd name="connsiteY5" fmla="*/ 57874 h 7118430"/>
+              <a:gd name="connsiteX6" fmla="*/ 23149 w 2986268"/>
+              <a:gd name="connsiteY6" fmla="*/ 0 h 7118430"/>
+            </a:gdLst>
+            <a:ahLst/>
+            <a:cxnLst>
+              <a:cxn ang="0">
+                <a:pos x="connsiteX0" y="connsiteY0"/>
+              </a:cxn>
+              <a:cxn ang="0">
+                <a:pos x="connsiteX1" y="connsiteY1"/>
+              </a:cxn>
+              <a:cxn ang="0">
+                <a:pos x="connsiteX2" y="connsiteY2"/>
+              </a:cxn>
+              <a:cxn ang="0">
+                <a:pos x="connsiteX3" y="connsiteY3"/>
+              </a:cxn>
+              <a:cxn ang="0">
+                <a:pos x="connsiteX4" y="connsiteY4"/>
+              </a:cxn>
+              <a:cxn ang="0">
+                <a:pos x="connsiteX5" y="connsiteY5"/>
+              </a:cxn>
+              <a:cxn ang="0">
+                <a:pos x="connsiteX6" y="connsiteY6"/>
+              </a:cxn>
+            </a:cxnLst>
+            <a:rect l="l" t="t" r="r" b="b"/>
+            <a:pathLst>
+              <a:path w="2986268" h="7118430">
+                <a:moveTo>
+                  <a:pt x="23149" y="0"/>
+                </a:moveTo>
+                <a:lnTo>
+                  <a:pt x="266217" y="0"/>
+                </a:lnTo>
+                <a:lnTo>
+                  <a:pt x="810227" y="3634451"/>
+                </a:lnTo>
+                <a:lnTo>
+                  <a:pt x="2986268" y="7118430"/>
+                </a:lnTo>
+                <a:lnTo>
+                  <a:pt x="0" y="7072132"/>
+                </a:lnTo>
+                <a:cubicBezTo>
+                  <a:pt x="7716" y="4734046"/>
+                  <a:pt x="15433" y="2395960"/>
+                  <a:pt x="23149" y="57874"/>
+                </a:cubicBezTo>
+                <a:lnTo>
+                  <a:pt x="23149" y="0"/>
+                </a:lnTo>
+                <a:close/>
+              </a:path>
+            </a:pathLst>
+          </a:custGeom>
+          <a:solidFill>
+            <a:srgbClr val="FF5600">
+              <a:alpha val="60000"/>
+            </a:srgbClr>
+          </a:solidFill>
+          <a:ln>
+            <a:noFill/>
+          </a:ln>
+        </p:spPr>
+        <p:style>
+          <a:lnRef idx="2">
+            <a:schemeClr val="accent1">
+              <a:shade val="50000"/>
+            </a:schemeClr>
+          </a:lnRef>
+          <a:fillRef idx="1">
+            <a:schemeClr val="accent1"/>
+          </a:fillRef>
+          <a:effectRef idx="0">
+            <a:schemeClr val="accent1"/>
+          </a:effectRef>
+          <a:fontRef idx="minor">
+            <a:schemeClr val="lt1"/>
+          </a:fontRef>
+        </p:style>
+        <p:txBody>
+          <a:bodyPr rtlCol="0" anchor="ctr"/>
+          <a:lstStyle/>
+          <a:p>
+            <a:pPr algn="ctr"/>
+            <a:endParaRPr lang="fr-FR"/>
+          </a:p>
+        </p:txBody>
+      </p:sp>
+      <p:sp>
+        <p:nvSpPr>
+          <p:cNvPr id="9" name="Forme libre : forme 8">
+            <a:extLst>
+              <a:ext uri="{FF2B5EF4-FFF2-40B4-BE49-F238E27FC236}">
+                <a16:creationId xmlns:a16="http://schemas.microsoft.com/office/drawing/2014/main" id="{2B00372C-3F5B-4F83-9717-E64814CAFECC}"/>
+              </a:ext>
+            </a:extLst>
+          </p:cNvPr>
+          <p:cNvSpPr/>
+          <p:nvPr/>
+        </p:nvSpPr>
+        <p:spPr>
+          <a:xfrm>
+            <a:off x="-105198" y="-57873"/>
+            <a:ext cx="2292813" cy="7025832"/>
+          </a:xfrm>
+          <a:custGeom>
+            <a:avLst/>
+            <a:gdLst>
+              <a:gd name="connsiteX0" fmla="*/ 1026 w 2292813"/>
+              <a:gd name="connsiteY0" fmla="*/ 11574 h 7025832"/>
+              <a:gd name="connsiteX1" fmla="*/ 730231 w 2292813"/>
+              <a:gd name="connsiteY1" fmla="*/ 11574 h 7025832"/>
+              <a:gd name="connsiteX2" fmla="*/ 915426 w 2292813"/>
+              <a:gd name="connsiteY2" fmla="*/ 0 h 7025832"/>
+              <a:gd name="connsiteX3" fmla="*/ 996449 w 2292813"/>
+              <a:gd name="connsiteY3" fmla="*/ 4444678 h 7025832"/>
+              <a:gd name="connsiteX4" fmla="*/ 2292813 w 2292813"/>
+              <a:gd name="connsiteY4" fmla="*/ 7025832 h 7025832"/>
+              <a:gd name="connsiteX5" fmla="*/ 12601 w 2292813"/>
+              <a:gd name="connsiteY5" fmla="*/ 6967959 h 7025832"/>
+              <a:gd name="connsiteX6" fmla="*/ 1026 w 2292813"/>
+              <a:gd name="connsiteY6" fmla="*/ 11574 h 7025832"/>
+            </a:gdLst>
+            <a:ahLst/>
+            <a:cxnLst>
+              <a:cxn ang="0">
+                <a:pos x="connsiteX0" y="connsiteY0"/>
+              </a:cxn>
+              <a:cxn ang="0">
+                <a:pos x="connsiteX1" y="connsiteY1"/>
+              </a:cxn>
+              <a:cxn ang="0">
+                <a:pos x="connsiteX2" y="connsiteY2"/>
+              </a:cxn>
+              <a:cxn ang="0">
+                <a:pos x="connsiteX3" y="connsiteY3"/>
+              </a:cxn>
+              <a:cxn ang="0">
+                <a:pos x="connsiteX4" y="connsiteY4"/>
+              </a:cxn>
+              <a:cxn ang="0">
+                <a:pos x="connsiteX5" y="connsiteY5"/>
+              </a:cxn>
+              <a:cxn ang="0">
+                <a:pos x="connsiteX6" y="connsiteY6"/>
+              </a:cxn>
+            </a:cxnLst>
+            <a:rect l="l" t="t" r="r" b="b"/>
+            <a:pathLst>
+              <a:path w="2292813" h="7025832">
+                <a:moveTo>
+                  <a:pt x="1026" y="11574"/>
+                </a:moveTo>
+                <a:lnTo>
+                  <a:pt x="730231" y="11574"/>
+                </a:lnTo>
+                <a:lnTo>
+                  <a:pt x="915426" y="0"/>
+                </a:lnTo>
+                <a:lnTo>
+                  <a:pt x="996449" y="4444678"/>
+                </a:lnTo>
+                <a:lnTo>
+                  <a:pt x="2292813" y="7025832"/>
+                </a:lnTo>
+                <a:lnTo>
+                  <a:pt x="12601" y="6967959"/>
+                </a:lnTo>
+                <a:cubicBezTo>
+                  <a:pt x="4884" y="4637589"/>
+                  <a:pt x="-2832" y="2307220"/>
+                  <a:pt x="1026" y="11574"/>
+                </a:cubicBezTo>
+                <a:close/>
+              </a:path>
+            </a:pathLst>
+          </a:custGeom>
+          <a:solidFill>
+            <a:srgbClr val="FF5600">
+              <a:alpha val="60000"/>
+            </a:srgbClr>
+          </a:solidFill>
+          <a:ln>
+            <a:noFill/>
+          </a:ln>
+        </p:spPr>
+        <p:style>
+          <a:lnRef idx="2">
+            <a:schemeClr val="accent1">
+              <a:shade val="50000"/>
+            </a:schemeClr>
+          </a:lnRef>
+          <a:fillRef idx="1">
+            <a:schemeClr val="accent1"/>
+          </a:fillRef>
+          <a:effectRef idx="0">
+            <a:schemeClr val="accent1"/>
+          </a:effectRef>
+          <a:fontRef idx="minor">
+            <a:schemeClr val="lt1"/>
+          </a:fontRef>
+        </p:style>
+        <p:txBody>
+          <a:bodyPr rtlCol="0" anchor="ctr"/>
+          <a:lstStyle/>
+          <a:p>
+            <a:pPr algn="ctr"/>
+            <a:endParaRPr lang="fr-FR"/>
+          </a:p>
+        </p:txBody>
+      </p:sp>
+      <p:pic>
+        <p:nvPicPr>
+          <p:cNvPr id="13" name="Image 12">
+            <a:extLst>
+              <a:ext uri="{FF2B5EF4-FFF2-40B4-BE49-F238E27FC236}">
+                <a16:creationId xmlns:a16="http://schemas.microsoft.com/office/drawing/2014/main" id="{3D11499F-9576-4549-B722-236EA76804EA}"/>
+              </a:ext>
+            </a:extLst>
+          </p:cNvPr>
+          <p:cNvPicPr>
+            <a:picLocks noChangeAspect="1"/>
+          </p:cNvPicPr>
+          <p:nvPr/>
+        </p:nvPicPr>
+        <p:blipFill>
+          <a:blip r:embed="rId2">
+            <a:extLst>
+              <a:ext uri="{28A0092B-C50C-407E-A947-70E740481C1C}">
+                <a14:useLocalDpi xmlns:a14="http://schemas.microsoft.com/office/drawing/2010/main" val="0"/>
+              </a:ext>
+            </a:extLst>
+          </a:blip>
+          <a:stretch>
+            <a:fillRect/>
+          </a:stretch>
+        </p:blipFill>
+        <p:spPr>
+          <a:xfrm>
+            <a:off x="-109959" y="4941425"/>
+            <a:ext cx="1628172" cy="1628172"/>
+          </a:xfrm>
+          <a:prstGeom prst="rect">
+            <a:avLst/>
+          </a:prstGeom>
+        </p:spPr>
+      </p:pic>
+      <p:sp>
+        <p:nvSpPr>
+          <p:cNvPr id="2" name="ZoneTexte 1">
+            <a:extLst>
+              <a:ext uri="{FF2B5EF4-FFF2-40B4-BE49-F238E27FC236}">
+                <a16:creationId xmlns:a16="http://schemas.microsoft.com/office/drawing/2014/main" id="{FF343CEB-D2E3-4F33-A8FE-62A40B642D3B}"/>
+              </a:ext>
+            </a:extLst>
+          </p:cNvPr>
+          <p:cNvSpPr txBox="1"/>
+          <p:nvPr/>
+        </p:nvSpPr>
+        <p:spPr>
+          <a:xfrm>
+            <a:off x="-109959" y="207380"/>
+            <a:ext cx="12301958" cy="1015663"/>
+          </a:xfrm>
+          <a:prstGeom prst="rect">
+            <a:avLst/>
+          </a:prstGeom>
+          <a:noFill/>
+        </p:spPr>
+        <p:txBody>
+          <a:bodyPr wrap="square" rtlCol="0">
+            <a:spAutoFit/>
+          </a:bodyPr>
+          <a:lstStyle/>
+          <a:p>
+            <a:pPr algn="ctr"/>
+            <a:r>
+              <a:rPr lang="fr-FR" sz="6000" b="1" spc="600" dirty="0"/>
+              <a:t>Référencement naturel</a:t>
+            </a:r>
+          </a:p>
+        </p:txBody>
+      </p:sp>
+      <p:sp>
+        <p:nvSpPr>
+          <p:cNvPr id="7" name="ZoneTexte 6">
+            <a:extLst>
+              <a:ext uri="{FF2B5EF4-FFF2-40B4-BE49-F238E27FC236}">
+                <a16:creationId xmlns:a16="http://schemas.microsoft.com/office/drawing/2014/main" id="{B381BF07-8636-4637-85CE-E31B37280C45}"/>
+              </a:ext>
+            </a:extLst>
+          </p:cNvPr>
+          <p:cNvSpPr txBox="1"/>
+          <p:nvPr/>
+        </p:nvSpPr>
+        <p:spPr>
+          <a:xfrm>
+            <a:off x="2893671" y="2070048"/>
+            <a:ext cx="8325293" cy="1384995"/>
+          </a:xfrm>
+          <a:prstGeom prst="rect">
+            <a:avLst/>
+          </a:prstGeom>
+          <a:noFill/>
+        </p:spPr>
+        <p:txBody>
+          <a:bodyPr wrap="square" rtlCol="0">
+            <a:spAutoFit/>
+          </a:bodyPr>
+          <a:lstStyle/>
+          <a:p>
+            <a:r>
+              <a:rPr lang="fr-FR" sz="2800" dirty="0"/>
+              <a:t>sitemap.xml</a:t>
+            </a:r>
+          </a:p>
+          <a:p>
+            <a:r>
+              <a:rPr lang="fr-FR" sz="2800" dirty="0"/>
+              <a:t>robot.txt</a:t>
+            </a:r>
+          </a:p>
+          <a:p>
+            <a:r>
+              <a:rPr lang="fr-FR" sz="2800" dirty="0"/>
+              <a:t>balise </a:t>
+            </a:r>
+            <a:r>
+              <a:rPr lang="fr-FR" sz="2800" dirty="0" err="1"/>
+              <a:t>meta</a:t>
+            </a:r>
+            <a:r>
+              <a:rPr lang="fr-FR" sz="2800" dirty="0"/>
+              <a:t> description</a:t>
+            </a:r>
+          </a:p>
+        </p:txBody>
+      </p:sp>
+    </p:spTree>
+    <p:extLst>
+      <p:ext uri="{BB962C8B-B14F-4D97-AF65-F5344CB8AC3E}">
+        <p14:creationId xmlns:p14="http://schemas.microsoft.com/office/powerpoint/2010/main" val="4251030148"/>
+      </p:ext>
+    </p:extLst>
+  </p:cSld>
+  <p:clrMapOvr>
+    <a:masterClrMapping/>
+  </p:clrMapOvr>
+</p:sld>
+</file>
+
+<file path=ppt/slides/slide3.xml><?xml version="1.0" encoding="utf-8"?>
+<p:sld xmlns:a="http://schemas.openxmlformats.org/drawingml/2006/main" xmlns:r="http://schemas.openxmlformats.org/officeDocument/2006/relationships" xmlns:p="http://schemas.openxmlformats.org/presentationml/2006/main">
+  <p:cSld>
+    <p:spTree>
+      <p:nvGrpSpPr>
+        <p:cNvPr id="1" name=""/>
+        <p:cNvGrpSpPr/>
+        <p:nvPr/>
+      </p:nvGrpSpPr>
+      <p:grpSpPr>
+        <a:xfrm>
+          <a:off x="0" y="0"/>
+          <a:ext cx="0" cy="0"/>
+          <a:chOff x="0" y="0"/>
+          <a:chExt cx="0" cy="0"/>
+        </a:xfrm>
+      </p:grpSpPr>
+      <p:sp>
+        <p:nvSpPr>
+          <p:cNvPr id="6" name="Forme libre : forme 5">
+            <a:extLst>
+              <a:ext uri="{FF2B5EF4-FFF2-40B4-BE49-F238E27FC236}">
+                <a16:creationId xmlns:a16="http://schemas.microsoft.com/office/drawing/2014/main" id="{241A3761-269D-42AC-9090-FF44C3F3F66B}"/>
+              </a:ext>
+            </a:extLst>
+          </p:cNvPr>
+          <p:cNvSpPr/>
+          <p:nvPr/>
+        </p:nvSpPr>
+        <p:spPr>
+          <a:xfrm>
+            <a:off x="-46299" y="-57873"/>
+            <a:ext cx="2650603" cy="6944810"/>
+          </a:xfrm>
+          <a:custGeom>
+            <a:avLst/>
+            <a:gdLst>
+              <a:gd name="connsiteX0" fmla="*/ 0 w 2650603"/>
+              <a:gd name="connsiteY0" fmla="*/ 11574 h 6944810"/>
+              <a:gd name="connsiteX1" fmla="*/ 11575 w 2650603"/>
+              <a:gd name="connsiteY1" fmla="*/ 6944810 h 6944810"/>
+              <a:gd name="connsiteX2" fmla="*/ 2650603 w 2650603"/>
+              <a:gd name="connsiteY2" fmla="*/ 6944810 h 6944810"/>
+              <a:gd name="connsiteX3" fmla="*/ 1169043 w 2650603"/>
+              <a:gd name="connsiteY3" fmla="*/ 2951544 h 6944810"/>
+              <a:gd name="connsiteX4" fmla="*/ 532436 w 2650603"/>
+              <a:gd name="connsiteY4" fmla="*/ 0 h 6944810"/>
+              <a:gd name="connsiteX5" fmla="*/ 0 w 2650603"/>
+              <a:gd name="connsiteY5" fmla="*/ 11574 h 6944810"/>
+            </a:gdLst>
+            <a:ahLst/>
+            <a:cxnLst>
+              <a:cxn ang="0">
+                <a:pos x="connsiteX0" y="connsiteY0"/>
+              </a:cxn>
+              <a:cxn ang="0">
+                <a:pos x="connsiteX1" y="connsiteY1"/>
+              </a:cxn>
+              <a:cxn ang="0">
+                <a:pos x="connsiteX2" y="connsiteY2"/>
+              </a:cxn>
+              <a:cxn ang="0">
+                <a:pos x="connsiteX3" y="connsiteY3"/>
+              </a:cxn>
+              <a:cxn ang="0">
+                <a:pos x="connsiteX4" y="connsiteY4"/>
+              </a:cxn>
+              <a:cxn ang="0">
+                <a:pos x="connsiteX5" y="connsiteY5"/>
+              </a:cxn>
+            </a:cxnLst>
+            <a:rect l="l" t="t" r="r" b="b"/>
+            <a:pathLst>
+              <a:path w="2650603" h="6944810">
+                <a:moveTo>
+                  <a:pt x="0" y="11574"/>
+                </a:moveTo>
+                <a:cubicBezTo>
+                  <a:pt x="3858" y="2322653"/>
+                  <a:pt x="7717" y="4633731"/>
+                  <a:pt x="11575" y="6944810"/>
+                </a:cubicBezTo>
+                <a:lnTo>
+                  <a:pt x="2650603" y="6944810"/>
+                </a:lnTo>
+                <a:lnTo>
+                  <a:pt x="1169043" y="2951544"/>
+                </a:lnTo>
+                <a:lnTo>
+                  <a:pt x="532436" y="0"/>
+                </a:lnTo>
+                <a:lnTo>
+                  <a:pt x="0" y="11574"/>
+                </a:lnTo>
+                <a:close/>
+              </a:path>
+            </a:pathLst>
+          </a:custGeom>
+          <a:solidFill>
+            <a:srgbClr val="FF5600">
+              <a:alpha val="60000"/>
+            </a:srgbClr>
+          </a:solidFill>
+          <a:ln>
+            <a:noFill/>
+          </a:ln>
+        </p:spPr>
+        <p:style>
+          <a:lnRef idx="2">
+            <a:schemeClr val="accent1">
+              <a:shade val="50000"/>
+            </a:schemeClr>
+          </a:lnRef>
+          <a:fillRef idx="1">
+            <a:schemeClr val="accent1"/>
+          </a:fillRef>
+          <a:effectRef idx="0">
+            <a:schemeClr val="accent1"/>
+          </a:effectRef>
+          <a:fontRef idx="minor">
+            <a:schemeClr val="lt1"/>
+          </a:fontRef>
+        </p:style>
+        <p:txBody>
+          <a:bodyPr rtlCol="0" anchor="ctr"/>
+          <a:lstStyle/>
+          <a:p>
+            <a:pPr algn="ctr"/>
+            <a:endParaRPr lang="fr-FR"/>
+          </a:p>
+        </p:txBody>
+      </p:sp>
+      <p:sp>
+        <p:nvSpPr>
+          <p:cNvPr id="8" name="Forme libre : forme 7">
+            <a:extLst>
+              <a:ext uri="{FF2B5EF4-FFF2-40B4-BE49-F238E27FC236}">
+                <a16:creationId xmlns:a16="http://schemas.microsoft.com/office/drawing/2014/main" id="{ECC6B823-349B-44E3-9784-B11CDCC243A0}"/>
+              </a:ext>
+            </a:extLst>
+          </p:cNvPr>
+          <p:cNvSpPr/>
+          <p:nvPr/>
+        </p:nvSpPr>
+        <p:spPr>
+          <a:xfrm>
+            <a:off x="-92597" y="-150471"/>
+            <a:ext cx="2986268" cy="7118430"/>
+          </a:xfrm>
+          <a:custGeom>
+            <a:avLst/>
+            <a:gdLst>
+              <a:gd name="connsiteX0" fmla="*/ 23149 w 2986268"/>
+              <a:gd name="connsiteY0" fmla="*/ 0 h 7118430"/>
+              <a:gd name="connsiteX1" fmla="*/ 266217 w 2986268"/>
+              <a:gd name="connsiteY1" fmla="*/ 0 h 7118430"/>
+              <a:gd name="connsiteX2" fmla="*/ 810227 w 2986268"/>
+              <a:gd name="connsiteY2" fmla="*/ 3634451 h 7118430"/>
+              <a:gd name="connsiteX3" fmla="*/ 2986268 w 2986268"/>
+              <a:gd name="connsiteY3" fmla="*/ 7118430 h 7118430"/>
+              <a:gd name="connsiteX4" fmla="*/ 0 w 2986268"/>
+              <a:gd name="connsiteY4" fmla="*/ 7072132 h 7118430"/>
+              <a:gd name="connsiteX5" fmla="*/ 23149 w 2986268"/>
+              <a:gd name="connsiteY5" fmla="*/ 57874 h 7118430"/>
+              <a:gd name="connsiteX6" fmla="*/ 23149 w 2986268"/>
+              <a:gd name="connsiteY6" fmla="*/ 0 h 7118430"/>
+            </a:gdLst>
+            <a:ahLst/>
+            <a:cxnLst>
+              <a:cxn ang="0">
+                <a:pos x="connsiteX0" y="connsiteY0"/>
+              </a:cxn>
+              <a:cxn ang="0">
+                <a:pos x="connsiteX1" y="connsiteY1"/>
+              </a:cxn>
+              <a:cxn ang="0">
+                <a:pos x="connsiteX2" y="connsiteY2"/>
+              </a:cxn>
+              <a:cxn ang="0">
+                <a:pos x="connsiteX3" y="connsiteY3"/>
+              </a:cxn>
+              <a:cxn ang="0">
+                <a:pos x="connsiteX4" y="connsiteY4"/>
+              </a:cxn>
+              <a:cxn ang="0">
+                <a:pos x="connsiteX5" y="connsiteY5"/>
+              </a:cxn>
+              <a:cxn ang="0">
+                <a:pos x="connsiteX6" y="connsiteY6"/>
+              </a:cxn>
+            </a:cxnLst>
+            <a:rect l="l" t="t" r="r" b="b"/>
+            <a:pathLst>
+              <a:path w="2986268" h="7118430">
+                <a:moveTo>
+                  <a:pt x="23149" y="0"/>
+                </a:moveTo>
+                <a:lnTo>
+                  <a:pt x="266217" y="0"/>
+                </a:lnTo>
+                <a:lnTo>
+                  <a:pt x="810227" y="3634451"/>
+                </a:lnTo>
+                <a:lnTo>
+                  <a:pt x="2986268" y="7118430"/>
+                </a:lnTo>
+                <a:lnTo>
+                  <a:pt x="0" y="7072132"/>
+                </a:lnTo>
+                <a:cubicBezTo>
+                  <a:pt x="7716" y="4734046"/>
+                  <a:pt x="15433" y="2395960"/>
+                  <a:pt x="23149" y="57874"/>
+                </a:cubicBezTo>
+                <a:lnTo>
+                  <a:pt x="23149" y="0"/>
+                </a:lnTo>
+                <a:close/>
+              </a:path>
+            </a:pathLst>
+          </a:custGeom>
+          <a:solidFill>
+            <a:srgbClr val="FF5600">
+              <a:alpha val="60000"/>
+            </a:srgbClr>
+          </a:solidFill>
+          <a:ln>
+            <a:noFill/>
+          </a:ln>
+        </p:spPr>
+        <p:style>
+          <a:lnRef idx="2">
+            <a:schemeClr val="accent1">
+              <a:shade val="50000"/>
+            </a:schemeClr>
+          </a:lnRef>
+          <a:fillRef idx="1">
+            <a:schemeClr val="accent1"/>
+          </a:fillRef>
+          <a:effectRef idx="0">
+            <a:schemeClr val="accent1"/>
+          </a:effectRef>
+          <a:fontRef idx="minor">
+            <a:schemeClr val="lt1"/>
+          </a:fontRef>
+        </p:style>
+        <p:txBody>
+          <a:bodyPr rtlCol="0" anchor="ctr"/>
+          <a:lstStyle/>
+          <a:p>
+            <a:pPr algn="ctr"/>
+            <a:endParaRPr lang="fr-FR"/>
+          </a:p>
+        </p:txBody>
+      </p:sp>
+      <p:sp>
+        <p:nvSpPr>
+          <p:cNvPr id="9" name="Forme libre : forme 8">
+            <a:extLst>
+              <a:ext uri="{FF2B5EF4-FFF2-40B4-BE49-F238E27FC236}">
+                <a16:creationId xmlns:a16="http://schemas.microsoft.com/office/drawing/2014/main" id="{2B00372C-3F5B-4F83-9717-E64814CAFECC}"/>
+              </a:ext>
+            </a:extLst>
+          </p:cNvPr>
+          <p:cNvSpPr/>
+          <p:nvPr/>
+        </p:nvSpPr>
+        <p:spPr>
+          <a:xfrm>
+            <a:off x="-105198" y="-57873"/>
+            <a:ext cx="2292813" cy="7025832"/>
+          </a:xfrm>
+          <a:custGeom>
+            <a:avLst/>
+            <a:gdLst>
+              <a:gd name="connsiteX0" fmla="*/ 1026 w 2292813"/>
+              <a:gd name="connsiteY0" fmla="*/ 11574 h 7025832"/>
+              <a:gd name="connsiteX1" fmla="*/ 730231 w 2292813"/>
+              <a:gd name="connsiteY1" fmla="*/ 11574 h 7025832"/>
+              <a:gd name="connsiteX2" fmla="*/ 915426 w 2292813"/>
+              <a:gd name="connsiteY2" fmla="*/ 0 h 7025832"/>
+              <a:gd name="connsiteX3" fmla="*/ 996449 w 2292813"/>
+              <a:gd name="connsiteY3" fmla="*/ 4444678 h 7025832"/>
+              <a:gd name="connsiteX4" fmla="*/ 2292813 w 2292813"/>
+              <a:gd name="connsiteY4" fmla="*/ 7025832 h 7025832"/>
+              <a:gd name="connsiteX5" fmla="*/ 12601 w 2292813"/>
+              <a:gd name="connsiteY5" fmla="*/ 6967959 h 7025832"/>
+              <a:gd name="connsiteX6" fmla="*/ 1026 w 2292813"/>
+              <a:gd name="connsiteY6" fmla="*/ 11574 h 7025832"/>
+            </a:gdLst>
+            <a:ahLst/>
+            <a:cxnLst>
+              <a:cxn ang="0">
+                <a:pos x="connsiteX0" y="connsiteY0"/>
+              </a:cxn>
+              <a:cxn ang="0">
+                <a:pos x="connsiteX1" y="connsiteY1"/>
+              </a:cxn>
+              <a:cxn ang="0">
+                <a:pos x="connsiteX2" y="connsiteY2"/>
+              </a:cxn>
+              <a:cxn ang="0">
+                <a:pos x="connsiteX3" y="connsiteY3"/>
+              </a:cxn>
+              <a:cxn ang="0">
+                <a:pos x="connsiteX4" y="connsiteY4"/>
+              </a:cxn>
+              <a:cxn ang="0">
+                <a:pos x="connsiteX5" y="connsiteY5"/>
+              </a:cxn>
+              <a:cxn ang="0">
+                <a:pos x="connsiteX6" y="connsiteY6"/>
+              </a:cxn>
+            </a:cxnLst>
+            <a:rect l="l" t="t" r="r" b="b"/>
+            <a:pathLst>
+              <a:path w="2292813" h="7025832">
+                <a:moveTo>
+                  <a:pt x="1026" y="11574"/>
+                </a:moveTo>
+                <a:lnTo>
+                  <a:pt x="730231" y="11574"/>
+                </a:lnTo>
+                <a:lnTo>
+                  <a:pt x="915426" y="0"/>
+                </a:lnTo>
+                <a:lnTo>
+                  <a:pt x="996449" y="4444678"/>
+                </a:lnTo>
+                <a:lnTo>
+                  <a:pt x="2292813" y="7025832"/>
+                </a:lnTo>
+                <a:lnTo>
+                  <a:pt x="12601" y="6967959"/>
+                </a:lnTo>
+                <a:cubicBezTo>
+                  <a:pt x="4884" y="4637589"/>
+                  <a:pt x="-2832" y="2307220"/>
+                  <a:pt x="1026" y="11574"/>
+                </a:cubicBezTo>
+                <a:close/>
+              </a:path>
+            </a:pathLst>
+          </a:custGeom>
+          <a:solidFill>
+            <a:srgbClr val="FF5600">
+              <a:alpha val="60000"/>
+            </a:srgbClr>
+          </a:solidFill>
+          <a:ln>
+            <a:noFill/>
+          </a:ln>
+        </p:spPr>
+        <p:style>
+          <a:lnRef idx="2">
+            <a:schemeClr val="accent1">
+              <a:shade val="50000"/>
+            </a:schemeClr>
+          </a:lnRef>
+          <a:fillRef idx="1">
+            <a:schemeClr val="accent1"/>
+          </a:fillRef>
+          <a:effectRef idx="0">
+            <a:schemeClr val="accent1"/>
+          </a:effectRef>
+          <a:fontRef idx="minor">
+            <a:schemeClr val="lt1"/>
+          </a:fontRef>
+        </p:style>
+        <p:txBody>
+          <a:bodyPr rtlCol="0" anchor="ctr"/>
+          <a:lstStyle/>
+          <a:p>
+            <a:pPr algn="ctr"/>
+            <a:endParaRPr lang="fr-FR"/>
+          </a:p>
+        </p:txBody>
+      </p:sp>
+      <p:pic>
+        <p:nvPicPr>
+          <p:cNvPr id="13" name="Image 12">
+            <a:extLst>
+              <a:ext uri="{FF2B5EF4-FFF2-40B4-BE49-F238E27FC236}">
+                <a16:creationId xmlns:a16="http://schemas.microsoft.com/office/drawing/2014/main" id="{3D11499F-9576-4549-B722-236EA76804EA}"/>
+              </a:ext>
+            </a:extLst>
+          </p:cNvPr>
+          <p:cNvPicPr>
+            <a:picLocks noChangeAspect="1"/>
+          </p:cNvPicPr>
+          <p:nvPr/>
+        </p:nvPicPr>
+        <p:blipFill>
+          <a:blip r:embed="rId2">
+            <a:extLst>
+              <a:ext uri="{28A0092B-C50C-407E-A947-70E740481C1C}">
+                <a14:useLocalDpi xmlns:a14="http://schemas.microsoft.com/office/drawing/2010/main" val="0"/>
+              </a:ext>
+            </a:extLst>
+          </a:blip>
+          <a:stretch>
+            <a:fillRect/>
+          </a:stretch>
+        </p:blipFill>
+        <p:spPr>
+          <a:xfrm>
+            <a:off x="-109959" y="4941425"/>
+            <a:ext cx="1628172" cy="1628172"/>
+          </a:xfrm>
+          <a:prstGeom prst="rect">
+            <a:avLst/>
+          </a:prstGeom>
+        </p:spPr>
+      </p:pic>
+      <p:pic>
+        <p:nvPicPr>
+          <p:cNvPr id="4" name="Image 3">
+            <a:extLst>
+              <a:ext uri="{FF2B5EF4-FFF2-40B4-BE49-F238E27FC236}">
+                <a16:creationId xmlns:a16="http://schemas.microsoft.com/office/drawing/2014/main" id="{E4D6D524-6760-48A3-BD47-90915DD5FF54}"/>
+              </a:ext>
+            </a:extLst>
+          </p:cNvPr>
+          <p:cNvPicPr>
+            <a:picLocks noChangeAspect="1"/>
+          </p:cNvPicPr>
+          <p:nvPr/>
+        </p:nvPicPr>
+        <p:blipFill>
+          <a:blip r:embed="rId3">
+            <a:extLst>
+              <a:ext uri="{28A0092B-C50C-407E-A947-70E740481C1C}">
+                <a14:useLocalDpi xmlns:a14="http://schemas.microsoft.com/office/drawing/2010/main" val="0"/>
+              </a:ext>
+            </a:extLst>
+          </a:blip>
+          <a:stretch>
+            <a:fillRect/>
+          </a:stretch>
+        </p:blipFill>
+        <p:spPr>
+          <a:xfrm>
+            <a:off x="3078662" y="518107"/>
+            <a:ext cx="2002344" cy="2084793"/>
+          </a:xfrm>
+          <a:prstGeom prst="rect">
+            <a:avLst/>
+          </a:prstGeom>
+        </p:spPr>
+      </p:pic>
+      <p:pic>
+        <p:nvPicPr>
+          <p:cNvPr id="3" name="Image 2">
+            <a:extLst>
+              <a:ext uri="{FF2B5EF4-FFF2-40B4-BE49-F238E27FC236}">
+                <a16:creationId xmlns:a16="http://schemas.microsoft.com/office/drawing/2014/main" id="{9728DA5D-7CB8-433F-8D33-2301ACDAC2D5}"/>
+              </a:ext>
+            </a:extLst>
+          </p:cNvPr>
+          <p:cNvPicPr>
+            <a:picLocks noChangeAspect="1"/>
+          </p:cNvPicPr>
+          <p:nvPr/>
+        </p:nvPicPr>
+        <p:blipFill>
+          <a:blip r:embed="rId4">
+            <a:extLst>
+              <a:ext uri="{28A0092B-C50C-407E-A947-70E740481C1C}">
+                <a14:useLocalDpi xmlns:a14="http://schemas.microsoft.com/office/drawing/2010/main" val="0"/>
+              </a:ext>
+            </a:extLst>
+          </a:blip>
+          <a:stretch>
+            <a:fillRect/>
+          </a:stretch>
+        </p:blipFill>
+        <p:spPr>
+          <a:xfrm>
+            <a:off x="7126460" y="518107"/>
+            <a:ext cx="1592988" cy="2086248"/>
+          </a:xfrm>
+          <a:prstGeom prst="rect">
+            <a:avLst/>
+          </a:prstGeom>
+        </p:spPr>
+      </p:pic>
+      <p:pic>
+        <p:nvPicPr>
+          <p:cNvPr id="7" name="Image 6">
+            <a:extLst>
+              <a:ext uri="{FF2B5EF4-FFF2-40B4-BE49-F238E27FC236}">
+                <a16:creationId xmlns:a16="http://schemas.microsoft.com/office/drawing/2014/main" id="{20B51A73-F3F2-49B4-BC66-A8E5488CE4D7}"/>
+              </a:ext>
+            </a:extLst>
+          </p:cNvPr>
+          <p:cNvPicPr>
+            <a:picLocks noChangeAspect="1"/>
+          </p:cNvPicPr>
+          <p:nvPr/>
+        </p:nvPicPr>
+        <p:blipFill>
+          <a:blip r:embed="rId5">
+            <a:extLst>
+              <a:ext uri="{28A0092B-C50C-407E-A947-70E740481C1C}">
+                <a14:useLocalDpi xmlns:a14="http://schemas.microsoft.com/office/drawing/2010/main" val="0"/>
+              </a:ext>
+            </a:extLst>
+          </a:blip>
+          <a:stretch>
+            <a:fillRect/>
+          </a:stretch>
+        </p:blipFill>
+        <p:spPr>
+          <a:xfrm>
+            <a:off x="3053855" y="3764104"/>
+            <a:ext cx="2084793" cy="2084793"/>
+          </a:xfrm>
+          <a:prstGeom prst="rect">
+            <a:avLst/>
+          </a:prstGeom>
+        </p:spPr>
+      </p:pic>
+      <p:pic>
+        <p:nvPicPr>
+          <p:cNvPr id="11" name="Image 10">
+            <a:extLst>
+              <a:ext uri="{FF2B5EF4-FFF2-40B4-BE49-F238E27FC236}">
+                <a16:creationId xmlns:a16="http://schemas.microsoft.com/office/drawing/2014/main" id="{233D85EF-2385-4C65-9381-F4754A589A61}"/>
+              </a:ext>
+            </a:extLst>
+          </p:cNvPr>
+          <p:cNvPicPr>
+            <a:picLocks noChangeAspect="1"/>
+          </p:cNvPicPr>
+          <p:nvPr/>
+        </p:nvPicPr>
+        <p:blipFill>
+          <a:blip r:embed="rId6">
+            <a:extLst>
+              <a:ext uri="{28A0092B-C50C-407E-A947-70E740481C1C}">
+                <a14:useLocalDpi xmlns:a14="http://schemas.microsoft.com/office/drawing/2010/main" val="0"/>
+              </a:ext>
+            </a:extLst>
+          </a:blip>
+          <a:stretch>
+            <a:fillRect/>
+          </a:stretch>
+        </p:blipFill>
+        <p:spPr>
+          <a:xfrm>
+            <a:off x="5994658" y="2847109"/>
+            <a:ext cx="5449580" cy="3850950"/>
           </a:xfrm>
           <a:prstGeom prst="rect">
             <a:avLst/>

</xml_diff>